<commit_message>
Add notes and explain duration and interval in array
</commit_message>
<xml_diff>
--- a/ksd-auth.pptx
+++ b/ksd-auth.pptx
@@ -136,6 +136,18 @@
 </p:presentation>
 </file>
 
+<file path=ppt/commentAuthors.xml><?xml version="1.0" encoding="utf-8"?>
+<p:cmAuthorLst xmlns:a="http://schemas.openxmlformats.org/drawingml/2006/main" xmlns:r="http://schemas.openxmlformats.org/officeDocument/2006/relationships" xmlns:p="http://schemas.openxmlformats.org/presentationml/2006/main">
+  <p:cmAuthor id="1" name="Myungho Jung" initials="MJ" lastIdx="1" clrIdx="0">
+    <p:extLst>
+      <p:ext uri="{19B8F6BF-5375-455C-9EA6-DF929625EA0E}">
+        <p15:presenceInfo xmlns:p15="http://schemas.microsoft.com/office/powerpoint/2012/main" userId="fe617781c3df8d11" providerId="Windows Live"/>
+      </p:ext>
+    </p:extLst>
+  </p:cmAuthor>
+</p:cmAuthorLst>
+</file>
+
 <file path=ppt/handoutMasters/handoutMaster1.xml><?xml version="1.0" encoding="utf-8"?>
 <p:handoutMaster xmlns:a="http://schemas.openxmlformats.org/drawingml/2006/main" xmlns:r="http://schemas.openxmlformats.org/officeDocument/2006/relationships" xmlns:p="http://schemas.openxmlformats.org/presentationml/2006/main">
   <p:cSld>
@@ -735,6 +747,800 @@
 </p:notes>
 </file>
 
+<file path=ppt/notesSlides/notesSlide10.xml><?xml version="1.0" encoding="utf-8"?>
+<p:notes xmlns:a="http://schemas.openxmlformats.org/drawingml/2006/main" xmlns:r="http://schemas.openxmlformats.org/officeDocument/2006/relationships" xmlns:p="http://schemas.openxmlformats.org/presentationml/2006/main">
+  <p:cSld>
+    <p:spTree>
+      <p:nvGrpSpPr>
+        <p:cNvPr id="1" name=""/>
+        <p:cNvGrpSpPr/>
+        <p:nvPr/>
+      </p:nvGrpSpPr>
+      <p:grpSpPr>
+        <a:xfrm>
+          <a:off x="0" y="0"/>
+          <a:ext cx="0" cy="0"/>
+          <a:chOff x="0" y="0"/>
+          <a:chExt cx="0" cy="0"/>
+        </a:xfrm>
+      </p:grpSpPr>
+      <p:sp>
+        <p:nvSpPr>
+          <p:cNvPr id="2" name="Slide Image Placeholder 1"/>
+          <p:cNvSpPr>
+            <a:spLocks noGrp="1" noRot="1" noChangeAspect="1"/>
+          </p:cNvSpPr>
+          <p:nvPr>
+            <p:ph type="sldImg"/>
+          </p:nvPr>
+        </p:nvSpPr>
+        <p:spPr/>
+      </p:sp>
+      <p:sp>
+        <p:nvSpPr>
+          <p:cNvPr id="3" name="Notes Placeholder 2"/>
+          <p:cNvSpPr>
+            <a:spLocks noGrp="1"/>
+          </p:cNvSpPr>
+          <p:nvPr>
+            <p:ph type="body" idx="1"/>
+          </p:nvPr>
+        </p:nvSpPr>
+        <p:spPr/>
+        <p:txBody>
+          <a:bodyPr/>
+          <a:lstStyle/>
+          <a:p>
+            <a:r>
+              <a:rPr lang="en-US" altLang="ko-KR" dirty="0" smtClean="0"/>
+              <a:t>Before</a:t>
+            </a:r>
+            <a:r>
+              <a:rPr lang="en-US" altLang="ko-KR" baseline="0" dirty="0" smtClean="0"/>
+              <a:t> explaining the test results, there are two kinds of error rates.</a:t>
+            </a:r>
+          </a:p>
+          <a:p>
+            <a:r>
+              <a:rPr lang="en-US" altLang="ko-KR" baseline="0" dirty="0" smtClean="0"/>
+              <a:t>First, false accept rate is the case that the imposter input password but accepted.</a:t>
+            </a:r>
+          </a:p>
+          <a:p>
+            <a:r>
+              <a:rPr lang="en-US" altLang="ko-KR" baseline="0" dirty="0" smtClean="0"/>
+              <a:t>Second, false reject rate means the actual user type password but rejected.</a:t>
+            </a:r>
+          </a:p>
+          <a:p>
+            <a:r>
+              <a:rPr lang="en-US" altLang="ko-KR" baseline="0" dirty="0" smtClean="0"/>
+              <a:t>In most cases, FAR is more important than FRR but high FRR will make the user annoyed.</a:t>
+            </a:r>
+          </a:p>
+          <a:p>
+            <a:endParaRPr lang="en-US" altLang="ko-KR" baseline="0" dirty="0" smtClean="0"/>
+          </a:p>
+          <a:p>
+            <a:r>
+              <a:rPr lang="en-US" altLang="ko-KR" baseline="0" dirty="0" smtClean="0"/>
+              <a:t>For the test, 1000 user’s pattern and the same number of imposter’s pattern. </a:t>
+            </a:r>
+          </a:p>
+          <a:p>
+            <a:r>
+              <a:rPr lang="en-US" altLang="ko-KR" baseline="0" dirty="0" smtClean="0"/>
+              <a:t>And the length of password is 10 which means each point is in 19 dimensional space.</a:t>
+            </a:r>
+          </a:p>
+          <a:p>
+            <a:r>
+              <a:rPr lang="en-US" altLang="ko-KR" baseline="0" dirty="0" smtClean="0"/>
+              <a:t>And each case is tested 100 times and averaged.</a:t>
+            </a:r>
+          </a:p>
+          <a:p>
+            <a:endParaRPr lang="en-US" altLang="ko-KR" baseline="0" dirty="0" smtClean="0"/>
+          </a:p>
+          <a:p>
+            <a:r>
+              <a:rPr lang="en-US" altLang="ko-KR" baseline="0" dirty="0" smtClean="0"/>
+              <a:t>First test is only one interval varies.</a:t>
+            </a:r>
+          </a:p>
+          <a:p>
+            <a:r>
+              <a:rPr lang="en-US" altLang="ko-KR" baseline="0" dirty="0" smtClean="0"/>
+              <a:t>Think about a user’s password consists of words and numbers.</a:t>
+            </a:r>
+          </a:p>
+          <a:p>
+            <a:r>
+              <a:rPr lang="en-US" altLang="ko-KR" baseline="0" dirty="0" smtClean="0"/>
+              <a:t>The pattern of word and the pattern of numbers will not change much but interval between the word and numbers would not be predictable.</a:t>
+            </a:r>
+          </a:p>
+          <a:p>
+            <a:endParaRPr lang="en-US" altLang="ko-KR" baseline="0" dirty="0" smtClean="0"/>
+          </a:p>
+          <a:p>
+            <a:r>
+              <a:rPr lang="en-US" altLang="ko-KR" baseline="0" dirty="0" smtClean="0"/>
+              <a:t>The x axis is standard deviation for the patterns.</a:t>
+            </a:r>
+          </a:p>
+          <a:p>
+            <a:r>
+              <a:rPr lang="en-US" altLang="ko-KR" baseline="0" dirty="0" smtClean="0"/>
+              <a:t>Higher ST generate sparsely distributed patterns which represent not experienced users.</a:t>
+            </a:r>
+          </a:p>
+          <a:p>
+            <a:r>
+              <a:rPr lang="en-US" altLang="ko-KR" baseline="0" dirty="0" smtClean="0"/>
+              <a:t>And patterns with lower ST indicates experienced users.</a:t>
+            </a:r>
+          </a:p>
+          <a:p>
+            <a:endParaRPr lang="en-US" altLang="ko-KR" baseline="0" dirty="0" smtClean="0"/>
+          </a:p>
+          <a:p>
+            <a:r>
+              <a:rPr lang="en-US" altLang="ko-KR" baseline="0" dirty="0" smtClean="0"/>
+              <a:t>The result shows that the SVMs shows the worst result because the number of samples is relatively small.</a:t>
+            </a:r>
+          </a:p>
+          <a:p>
+            <a:r>
+              <a:rPr lang="en-US" altLang="ko-KR" baseline="0" dirty="0" smtClean="0"/>
+              <a:t>With 10,000 samples, SVMs showed the best results among them.</a:t>
+            </a:r>
+          </a:p>
+          <a:p>
+            <a:endParaRPr lang="en-US" altLang="ko-KR" baseline="0" dirty="0" smtClean="0"/>
+          </a:p>
+        </p:txBody>
+      </p:sp>
+      <p:sp>
+        <p:nvSpPr>
+          <p:cNvPr id="4" name="Slide Number Placeholder 3"/>
+          <p:cNvSpPr>
+            <a:spLocks noGrp="1"/>
+          </p:cNvSpPr>
+          <p:nvPr>
+            <p:ph type="sldNum" sz="quarter" idx="10"/>
+          </p:nvPr>
+        </p:nvSpPr>
+        <p:spPr/>
+        <p:txBody>
+          <a:bodyPr/>
+          <a:lstStyle/>
+          <a:p>
+            <a:fld id="{DA8CEE05-2CC8-4BE2-9CB7-F5328E3659FA}" type="slidenum">
+              <a:rPr lang="en-US" smtClean="0"/>
+              <a:t>10</a:t>
+            </a:fld>
+            <a:endParaRPr lang="en-US"/>
+          </a:p>
+        </p:txBody>
+      </p:sp>
+    </p:spTree>
+    <p:extLst>
+      <p:ext uri="{BB962C8B-B14F-4D97-AF65-F5344CB8AC3E}">
+        <p14:creationId xmlns:p14="http://schemas.microsoft.com/office/powerpoint/2010/main" val="1286412525"/>
+      </p:ext>
+    </p:extLst>
+  </p:cSld>
+  <p:clrMapOvr>
+    <a:masterClrMapping/>
+  </p:clrMapOvr>
+</p:notes>
+</file>
+
+<file path=ppt/notesSlides/notesSlide11.xml><?xml version="1.0" encoding="utf-8"?>
+<p:notes xmlns:a="http://schemas.openxmlformats.org/drawingml/2006/main" xmlns:r="http://schemas.openxmlformats.org/officeDocument/2006/relationships" xmlns:p="http://schemas.openxmlformats.org/presentationml/2006/main">
+  <p:cSld>
+    <p:spTree>
+      <p:nvGrpSpPr>
+        <p:cNvPr id="1" name=""/>
+        <p:cNvGrpSpPr/>
+        <p:nvPr/>
+      </p:nvGrpSpPr>
+      <p:grpSpPr>
+        <a:xfrm>
+          <a:off x="0" y="0"/>
+          <a:ext cx="0" cy="0"/>
+          <a:chOff x="0" y="0"/>
+          <a:chExt cx="0" cy="0"/>
+        </a:xfrm>
+      </p:grpSpPr>
+      <p:sp>
+        <p:nvSpPr>
+          <p:cNvPr id="2" name="Slide Image Placeholder 1"/>
+          <p:cNvSpPr>
+            <a:spLocks noGrp="1" noRot="1" noChangeAspect="1"/>
+          </p:cNvSpPr>
+          <p:nvPr>
+            <p:ph type="sldImg"/>
+          </p:nvPr>
+        </p:nvSpPr>
+        <p:spPr/>
+      </p:sp>
+      <p:sp>
+        <p:nvSpPr>
+          <p:cNvPr id="3" name="Notes Placeholder 2"/>
+          <p:cNvSpPr>
+            <a:spLocks noGrp="1"/>
+          </p:cNvSpPr>
+          <p:nvPr>
+            <p:ph type="body" idx="1"/>
+          </p:nvPr>
+        </p:nvSpPr>
+        <p:spPr/>
+        <p:txBody>
+          <a:bodyPr/>
+          <a:lstStyle/>
+          <a:p>
+            <a:r>
+              <a:rPr lang="en-US" altLang="ko-KR" dirty="0" smtClean="0"/>
+              <a:t>Second</a:t>
+            </a:r>
+            <a:r>
+              <a:rPr lang="en-US" altLang="ko-KR" baseline="0" dirty="0" smtClean="0"/>
+              <a:t> test is for proportional patterns.</a:t>
+            </a:r>
+          </a:p>
+          <a:p>
+            <a:r>
+              <a:rPr lang="en-US" altLang="ko-KR" baseline="0" dirty="0" smtClean="0"/>
+              <a:t>It indicates the patterns are different but proportional.</a:t>
+            </a:r>
+          </a:p>
+          <a:p>
+            <a:endParaRPr lang="en-US" altLang="ko-KR" baseline="0" dirty="0" smtClean="0"/>
+          </a:p>
+          <a:p>
+            <a:r>
+              <a:rPr lang="en-US" altLang="ko-KR" baseline="0" dirty="0" smtClean="0"/>
+              <a:t>The result is similar to the previous one.</a:t>
+            </a:r>
+          </a:p>
+        </p:txBody>
+      </p:sp>
+      <p:sp>
+        <p:nvSpPr>
+          <p:cNvPr id="4" name="Slide Number Placeholder 3"/>
+          <p:cNvSpPr>
+            <a:spLocks noGrp="1"/>
+          </p:cNvSpPr>
+          <p:nvPr>
+            <p:ph type="sldNum" sz="quarter" idx="10"/>
+          </p:nvPr>
+        </p:nvSpPr>
+        <p:spPr/>
+        <p:txBody>
+          <a:bodyPr/>
+          <a:lstStyle/>
+          <a:p>
+            <a:fld id="{DA8CEE05-2CC8-4BE2-9CB7-F5328E3659FA}" type="slidenum">
+              <a:rPr lang="en-US" smtClean="0"/>
+              <a:t>11</a:t>
+            </a:fld>
+            <a:endParaRPr lang="en-US"/>
+          </a:p>
+        </p:txBody>
+      </p:sp>
+    </p:spTree>
+    <p:extLst>
+      <p:ext uri="{BB962C8B-B14F-4D97-AF65-F5344CB8AC3E}">
+        <p14:creationId xmlns:p14="http://schemas.microsoft.com/office/powerpoint/2010/main" val="2175641769"/>
+      </p:ext>
+    </p:extLst>
+  </p:cSld>
+  <p:clrMapOvr>
+    <a:masterClrMapping/>
+  </p:clrMapOvr>
+</p:notes>
+</file>
+
+<file path=ppt/notesSlides/notesSlide12.xml><?xml version="1.0" encoding="utf-8"?>
+<p:notes xmlns:a="http://schemas.openxmlformats.org/drawingml/2006/main" xmlns:r="http://schemas.openxmlformats.org/officeDocument/2006/relationships" xmlns:p="http://schemas.openxmlformats.org/presentationml/2006/main">
+  <p:cSld>
+    <p:spTree>
+      <p:nvGrpSpPr>
+        <p:cNvPr id="1" name=""/>
+        <p:cNvGrpSpPr/>
+        <p:nvPr/>
+      </p:nvGrpSpPr>
+      <p:grpSpPr>
+        <a:xfrm>
+          <a:off x="0" y="0"/>
+          <a:ext cx="0" cy="0"/>
+          <a:chOff x="0" y="0"/>
+          <a:chExt cx="0" cy="0"/>
+        </a:xfrm>
+      </p:grpSpPr>
+      <p:sp>
+        <p:nvSpPr>
+          <p:cNvPr id="2" name="Slide Image Placeholder 1"/>
+          <p:cNvSpPr>
+            <a:spLocks noGrp="1" noRot="1" noChangeAspect="1"/>
+          </p:cNvSpPr>
+          <p:nvPr>
+            <p:ph type="sldImg"/>
+          </p:nvPr>
+        </p:nvSpPr>
+        <p:spPr/>
+      </p:sp>
+      <p:sp>
+        <p:nvSpPr>
+          <p:cNvPr id="3" name="Notes Placeholder 2"/>
+          <p:cNvSpPr>
+            <a:spLocks noGrp="1"/>
+          </p:cNvSpPr>
+          <p:nvPr>
+            <p:ph type="body" idx="1"/>
+          </p:nvPr>
+        </p:nvSpPr>
+        <p:spPr/>
+        <p:txBody>
+          <a:bodyPr/>
+          <a:lstStyle/>
+          <a:p>
+            <a:r>
+              <a:rPr lang="en-US" altLang="ko-KR" dirty="0" smtClean="0"/>
+              <a:t>And</a:t>
+            </a:r>
+            <a:r>
+              <a:rPr lang="en-US" altLang="ko-KR" baseline="0" dirty="0" smtClean="0"/>
+              <a:t> this test is simulating the case that a user is using multiple devices.</a:t>
+            </a:r>
+          </a:p>
+          <a:p>
+            <a:r>
+              <a:rPr lang="en-US" altLang="ko-KR" baseline="0" dirty="0" smtClean="0"/>
+              <a:t>For example, if a user logs in using mobile phone and laptop computer, the patterns would be divided into multiple clusters.</a:t>
+            </a:r>
+          </a:p>
+          <a:p>
+            <a:endParaRPr lang="en-US" altLang="ko-KR" baseline="0" dirty="0" smtClean="0"/>
+          </a:p>
+          <a:p>
+            <a:r>
+              <a:rPr lang="en-US" altLang="ko-KR" baseline="0" dirty="0" smtClean="0"/>
+              <a:t>With these three tests, we concludes that there is no huge difference in results of algorithms depending on the user’s pattern. And Nearest Neighbor algorithms showed best performance unless there are more than 10,000 patterns.</a:t>
+            </a:r>
+            <a:endParaRPr lang="ko-KR" altLang="en-US" dirty="0"/>
+          </a:p>
+        </p:txBody>
+      </p:sp>
+      <p:sp>
+        <p:nvSpPr>
+          <p:cNvPr id="4" name="Slide Number Placeholder 3"/>
+          <p:cNvSpPr>
+            <a:spLocks noGrp="1"/>
+          </p:cNvSpPr>
+          <p:nvPr>
+            <p:ph type="sldNum" sz="quarter" idx="10"/>
+          </p:nvPr>
+        </p:nvSpPr>
+        <p:spPr/>
+        <p:txBody>
+          <a:bodyPr/>
+          <a:lstStyle/>
+          <a:p>
+            <a:fld id="{DA8CEE05-2CC8-4BE2-9CB7-F5328E3659FA}" type="slidenum">
+              <a:rPr lang="en-US" smtClean="0"/>
+              <a:t>12</a:t>
+            </a:fld>
+            <a:endParaRPr lang="en-US"/>
+          </a:p>
+        </p:txBody>
+      </p:sp>
+    </p:spTree>
+    <p:extLst>
+      <p:ext uri="{BB962C8B-B14F-4D97-AF65-F5344CB8AC3E}">
+        <p14:creationId xmlns:p14="http://schemas.microsoft.com/office/powerpoint/2010/main" val="105189116"/>
+      </p:ext>
+    </p:extLst>
+  </p:cSld>
+  <p:clrMapOvr>
+    <a:masterClrMapping/>
+  </p:clrMapOvr>
+</p:notes>
+</file>
+
+<file path=ppt/notesSlides/notesSlide13.xml><?xml version="1.0" encoding="utf-8"?>
+<p:notes xmlns:a="http://schemas.openxmlformats.org/drawingml/2006/main" xmlns:r="http://schemas.openxmlformats.org/officeDocument/2006/relationships" xmlns:p="http://schemas.openxmlformats.org/presentationml/2006/main">
+  <p:cSld>
+    <p:spTree>
+      <p:nvGrpSpPr>
+        <p:cNvPr id="1" name=""/>
+        <p:cNvGrpSpPr/>
+        <p:nvPr/>
+      </p:nvGrpSpPr>
+      <p:grpSpPr>
+        <a:xfrm>
+          <a:off x="0" y="0"/>
+          <a:ext cx="0" cy="0"/>
+          <a:chOff x="0" y="0"/>
+          <a:chExt cx="0" cy="0"/>
+        </a:xfrm>
+      </p:grpSpPr>
+      <p:sp>
+        <p:nvSpPr>
+          <p:cNvPr id="2" name="幻灯片图像占位符 1"/>
+          <p:cNvSpPr>
+            <a:spLocks noGrp="1" noRot="1" noChangeAspect="1"/>
+          </p:cNvSpPr>
+          <p:nvPr>
+            <p:ph type="sldImg"/>
+          </p:nvPr>
+        </p:nvSpPr>
+        <p:spPr/>
+      </p:sp>
+      <p:sp>
+        <p:nvSpPr>
+          <p:cNvPr id="3" name="备注占位符 2"/>
+          <p:cNvSpPr>
+            <a:spLocks noGrp="1"/>
+          </p:cNvSpPr>
+          <p:nvPr>
+            <p:ph type="body" idx="1"/>
+          </p:nvPr>
+        </p:nvSpPr>
+        <p:spPr/>
+        <p:txBody>
+          <a:bodyPr/>
+          <a:lstStyle/>
+          <a:p>
+            <a:r>
+              <a:rPr lang="en-US" altLang="zh-CN" dirty="0" smtClean="0"/>
+              <a:t>Our</a:t>
+            </a:r>
+            <a:r>
+              <a:rPr lang="en-US" altLang="zh-CN" baseline="0" dirty="0" smtClean="0"/>
+              <a:t> authentication protocol defines how to transmit the pattern and password to the server.</a:t>
+            </a:r>
+          </a:p>
+          <a:p>
+            <a:r>
+              <a:rPr lang="en-US" altLang="zh-CN" baseline="0" dirty="0" smtClean="0"/>
+              <a:t>We had three design considerations for the protocol.</a:t>
+            </a:r>
+          </a:p>
+          <a:p>
+            <a:r>
+              <a:rPr lang="en-US" altLang="zh-CN" baseline="0" dirty="0" smtClean="0"/>
+              <a:t>First, we don’t want the password exposed in plaintext.</a:t>
+            </a:r>
+          </a:p>
+          <a:p>
+            <a:r>
+              <a:rPr lang="en-US" altLang="zh-CN" baseline="0" dirty="0" smtClean="0"/>
+              <a:t>Second, we want the timing pattern being well-protected.</a:t>
+            </a:r>
+          </a:p>
+          <a:p>
+            <a:r>
+              <a:rPr lang="en-US" altLang="zh-CN" baseline="0" dirty="0" smtClean="0"/>
+              <a:t>Third, we want to prevent the replay attack.</a:t>
+            </a:r>
+          </a:p>
+        </p:txBody>
+      </p:sp>
+      <p:sp>
+        <p:nvSpPr>
+          <p:cNvPr id="4" name="灯片编号占位符 3"/>
+          <p:cNvSpPr>
+            <a:spLocks noGrp="1"/>
+          </p:cNvSpPr>
+          <p:nvPr>
+            <p:ph type="sldNum" sz="quarter" idx="10"/>
+          </p:nvPr>
+        </p:nvSpPr>
+        <p:spPr/>
+        <p:txBody>
+          <a:bodyPr/>
+          <a:lstStyle/>
+          <a:p>
+            <a:fld id="{DA8CEE05-2CC8-4BE2-9CB7-F5328E3659FA}" type="slidenum">
+              <a:rPr lang="en-US" smtClean="0"/>
+              <a:t>13</a:t>
+            </a:fld>
+            <a:endParaRPr lang="en-US"/>
+          </a:p>
+        </p:txBody>
+      </p:sp>
+    </p:spTree>
+    <p:extLst>
+      <p:ext uri="{BB962C8B-B14F-4D97-AF65-F5344CB8AC3E}">
+        <p14:creationId xmlns:p14="http://schemas.microsoft.com/office/powerpoint/2010/main" val="910549197"/>
+      </p:ext>
+    </p:extLst>
+  </p:cSld>
+  <p:clrMapOvr>
+    <a:masterClrMapping/>
+  </p:clrMapOvr>
+</p:notes>
+</file>
+
+<file path=ppt/notesSlides/notesSlide14.xml><?xml version="1.0" encoding="utf-8"?>
+<p:notes xmlns:a="http://schemas.openxmlformats.org/drawingml/2006/main" xmlns:r="http://schemas.openxmlformats.org/officeDocument/2006/relationships" xmlns:p="http://schemas.openxmlformats.org/presentationml/2006/main">
+  <p:cSld>
+    <p:spTree>
+      <p:nvGrpSpPr>
+        <p:cNvPr id="1" name=""/>
+        <p:cNvGrpSpPr/>
+        <p:nvPr/>
+      </p:nvGrpSpPr>
+      <p:grpSpPr>
+        <a:xfrm>
+          <a:off x="0" y="0"/>
+          <a:ext cx="0" cy="0"/>
+          <a:chOff x="0" y="0"/>
+          <a:chExt cx="0" cy="0"/>
+        </a:xfrm>
+      </p:grpSpPr>
+      <p:sp>
+        <p:nvSpPr>
+          <p:cNvPr id="2" name="幻灯片图像占位符 1"/>
+          <p:cNvSpPr>
+            <a:spLocks noGrp="1" noRot="1" noChangeAspect="1"/>
+          </p:cNvSpPr>
+          <p:nvPr>
+            <p:ph type="sldImg"/>
+          </p:nvPr>
+        </p:nvSpPr>
+        <p:spPr/>
+      </p:sp>
+      <p:sp>
+        <p:nvSpPr>
+          <p:cNvPr id="3" name="备注占位符 2"/>
+          <p:cNvSpPr>
+            <a:spLocks noGrp="1"/>
+          </p:cNvSpPr>
+          <p:nvPr>
+            <p:ph type="body" idx="1"/>
+          </p:nvPr>
+        </p:nvSpPr>
+        <p:spPr/>
+        <p:txBody>
+          <a:bodyPr/>
+          <a:lstStyle/>
+          <a:p>
+            <a:r>
+              <a:rPr lang="en-US" altLang="zh-CN" dirty="0" smtClean="0"/>
+              <a:t>Here is how we meet the design</a:t>
+            </a:r>
+            <a:r>
+              <a:rPr lang="en-US" altLang="zh-CN" baseline="0" dirty="0" smtClean="0"/>
+              <a:t> goals. We use this structure to send the timing pattern to the server.</a:t>
+            </a:r>
+          </a:p>
+          <a:p>
+            <a:r>
+              <a:rPr lang="en-US" altLang="zh-CN" baseline="0" dirty="0" smtClean="0"/>
+              <a:t>The key is the AES encryption key. It is generated from the password.</a:t>
+            </a:r>
+          </a:p>
+          <a:p>
+            <a:r>
+              <a:rPr lang="en-US" altLang="zh-CN" baseline="0" dirty="0" smtClean="0"/>
+              <a:t>The pattern is the timing pattern, encoded into a JSON string.</a:t>
+            </a:r>
+          </a:p>
+          <a:p>
+            <a:r>
+              <a:rPr lang="en-US" altLang="zh-CN" baseline="0" dirty="0" smtClean="0"/>
+              <a:t>We concatenate pattern with a timestamp. And compute a hash of the two parts.</a:t>
+            </a:r>
+          </a:p>
+          <a:p>
+            <a:r>
+              <a:rPr lang="en-US" altLang="zh-CN" baseline="0" dirty="0" smtClean="0"/>
+              <a:t>Then we use the generated key to encrypt the pattern as well as the hash and the timestamp, and send it to the server.</a:t>
+            </a:r>
+          </a:p>
+          <a:p>
+            <a:endParaRPr lang="en-US" altLang="zh-CN" baseline="0" dirty="0" smtClean="0"/>
+          </a:p>
+          <a:p>
+            <a:r>
+              <a:rPr lang="en-US" altLang="zh-CN" baseline="0" dirty="0" smtClean="0"/>
+              <a:t>As you can see, the password is not being transmitted in any form in the message. And the pattern is protected by AES. And because we use the timestamp, the replay attack is also prevented. All of the three goals are met.</a:t>
+            </a:r>
+            <a:endParaRPr lang="zh-CN" altLang="en-US" dirty="0"/>
+          </a:p>
+        </p:txBody>
+      </p:sp>
+      <p:sp>
+        <p:nvSpPr>
+          <p:cNvPr id="4" name="灯片编号占位符 3"/>
+          <p:cNvSpPr>
+            <a:spLocks noGrp="1"/>
+          </p:cNvSpPr>
+          <p:nvPr>
+            <p:ph type="sldNum" sz="quarter" idx="10"/>
+          </p:nvPr>
+        </p:nvSpPr>
+        <p:spPr/>
+        <p:txBody>
+          <a:bodyPr/>
+          <a:lstStyle/>
+          <a:p>
+            <a:fld id="{DA8CEE05-2CC8-4BE2-9CB7-F5328E3659FA}" type="slidenum">
+              <a:rPr lang="en-US" smtClean="0"/>
+              <a:t>14</a:t>
+            </a:fld>
+            <a:endParaRPr lang="en-US"/>
+          </a:p>
+        </p:txBody>
+      </p:sp>
+    </p:spTree>
+    <p:extLst>
+      <p:ext uri="{BB962C8B-B14F-4D97-AF65-F5344CB8AC3E}">
+        <p14:creationId xmlns:p14="http://schemas.microsoft.com/office/powerpoint/2010/main" val="3488594575"/>
+      </p:ext>
+    </p:extLst>
+  </p:cSld>
+  <p:clrMapOvr>
+    <a:masterClrMapping/>
+  </p:clrMapOvr>
+</p:notes>
+</file>
+
+<file path=ppt/notesSlides/notesSlide15.xml><?xml version="1.0" encoding="utf-8"?>
+<p:notes xmlns:a="http://schemas.openxmlformats.org/drawingml/2006/main" xmlns:r="http://schemas.openxmlformats.org/officeDocument/2006/relationships" xmlns:p="http://schemas.openxmlformats.org/presentationml/2006/main">
+  <p:cSld>
+    <p:spTree>
+      <p:nvGrpSpPr>
+        <p:cNvPr id="1" name=""/>
+        <p:cNvGrpSpPr/>
+        <p:nvPr/>
+      </p:nvGrpSpPr>
+      <p:grpSpPr>
+        <a:xfrm>
+          <a:off x="0" y="0"/>
+          <a:ext cx="0" cy="0"/>
+          <a:chOff x="0" y="0"/>
+          <a:chExt cx="0" cy="0"/>
+        </a:xfrm>
+      </p:grpSpPr>
+      <p:sp>
+        <p:nvSpPr>
+          <p:cNvPr id="2" name="幻灯片图像占位符 1"/>
+          <p:cNvSpPr>
+            <a:spLocks noGrp="1" noRot="1" noChangeAspect="1"/>
+          </p:cNvSpPr>
+          <p:nvPr>
+            <p:ph type="sldImg"/>
+          </p:nvPr>
+        </p:nvSpPr>
+        <p:spPr/>
+      </p:sp>
+      <p:sp>
+        <p:nvSpPr>
+          <p:cNvPr id="3" name="备注占位符 2"/>
+          <p:cNvSpPr>
+            <a:spLocks noGrp="1"/>
+          </p:cNvSpPr>
+          <p:nvPr>
+            <p:ph type="body" idx="1"/>
+          </p:nvPr>
+        </p:nvSpPr>
+        <p:spPr/>
+        <p:txBody>
+          <a:bodyPr/>
+          <a:lstStyle/>
+          <a:p>
+            <a:r>
+              <a:rPr lang="en-US" altLang="zh-CN" dirty="0" smtClean="0"/>
+              <a:t>Here is a</a:t>
+            </a:r>
+            <a:r>
+              <a:rPr lang="en-US" altLang="zh-CN" baseline="0" dirty="0" smtClean="0"/>
+              <a:t> problem. How can we verify the password without transmitting it. Actually, it is implied in our design.</a:t>
+            </a:r>
+          </a:p>
+          <a:p>
+            <a:endParaRPr lang="en-US" altLang="zh-CN" baseline="0" dirty="0" smtClean="0"/>
+          </a:p>
+          <a:p>
+            <a:r>
+              <a:rPr lang="en-US" altLang="zh-CN" baseline="0" dirty="0" smtClean="0"/>
+              <a:t>When server receive the encrypted pattern, it first retrieve the password of the user from the database.</a:t>
+            </a:r>
+          </a:p>
+          <a:p>
+            <a:r>
+              <a:rPr lang="en-US" altLang="zh-CN" baseline="0" dirty="0" smtClean="0"/>
+              <a:t>Then, it generate the AES key in the same way as the frontend.</a:t>
+            </a:r>
+          </a:p>
+          <a:p>
+            <a:r>
+              <a:rPr lang="en-US" altLang="zh-CN" baseline="0" dirty="0" smtClean="0"/>
+              <a:t>Then, decrypt the message with the key.</a:t>
+            </a:r>
+          </a:p>
+          <a:p>
+            <a:r>
+              <a:rPr lang="en-US" altLang="zh-CN" baseline="0" dirty="0" smtClean="0"/>
+              <a:t>Extract the hash, the timestamp and the pattern.</a:t>
+            </a:r>
+          </a:p>
+          <a:p>
+            <a:r>
+              <a:rPr lang="en-US" altLang="zh-CN" baseline="0" dirty="0" smtClean="0"/>
+              <a:t>Compute a hash of the timestamp and the pattern,</a:t>
+            </a:r>
+          </a:p>
+          <a:p>
+            <a:r>
+              <a:rPr lang="en-US" altLang="zh-CN" baseline="0" dirty="0" smtClean="0"/>
+              <a:t>Check if the hash matches what was received.</a:t>
+            </a:r>
+          </a:p>
+          <a:p>
+            <a:r>
+              <a:rPr lang="en-US" altLang="zh-CN" baseline="0" dirty="0" smtClean="0"/>
+              <a:t>Then check if the timestamp is still valid.</a:t>
+            </a:r>
+          </a:p>
+          <a:p>
+            <a:r>
+              <a:rPr lang="en-US" altLang="zh-CN" baseline="0" dirty="0" smtClean="0"/>
+              <a:t>If so, the user is authenticated.</a:t>
+            </a:r>
+          </a:p>
+          <a:p>
+            <a:endParaRPr lang="en-US" altLang="zh-CN" baseline="0" dirty="0" smtClean="0"/>
+          </a:p>
+          <a:p>
+            <a:r>
+              <a:rPr lang="en-US" altLang="zh-CN" baseline="0" dirty="0" smtClean="0"/>
+              <a:t>The trick is that if the user provides an incorrect password, we won’t be able to decrypt the message. Therefore, the two hash cannot match. The purpose of having the hash here is to determine whether the message is decrypted correctly. So only when the correct password is provided, everything would work.</a:t>
+            </a:r>
+          </a:p>
+        </p:txBody>
+      </p:sp>
+      <p:sp>
+        <p:nvSpPr>
+          <p:cNvPr id="4" name="灯片编号占位符 3"/>
+          <p:cNvSpPr>
+            <a:spLocks noGrp="1"/>
+          </p:cNvSpPr>
+          <p:nvPr>
+            <p:ph type="sldNum" sz="quarter" idx="10"/>
+          </p:nvPr>
+        </p:nvSpPr>
+        <p:spPr/>
+        <p:txBody>
+          <a:bodyPr/>
+          <a:lstStyle/>
+          <a:p>
+            <a:fld id="{DA8CEE05-2CC8-4BE2-9CB7-F5328E3659FA}" type="slidenum">
+              <a:rPr lang="en-US" smtClean="0"/>
+              <a:t>15</a:t>
+            </a:fld>
+            <a:endParaRPr lang="en-US"/>
+          </a:p>
+        </p:txBody>
+      </p:sp>
+    </p:spTree>
+    <p:extLst>
+      <p:ext uri="{BB962C8B-B14F-4D97-AF65-F5344CB8AC3E}">
+        <p14:creationId xmlns:p14="http://schemas.microsoft.com/office/powerpoint/2010/main" val="1880353969"/>
+      </p:ext>
+    </p:extLst>
+  </p:cSld>
+  <p:clrMapOvr>
+    <a:masterClrMapping/>
+  </p:clrMapOvr>
+</p:notes>
+</file>
+
 <file path=ppt/notesSlides/notesSlide2.xml><?xml version="1.0" encoding="utf-8"?>
 <p:notes xmlns:a="http://schemas.openxmlformats.org/drawingml/2006/main" xmlns:r="http://schemas.openxmlformats.org/officeDocument/2006/relationships" xmlns:p="http://schemas.openxmlformats.org/presentationml/2006/main">
   <p:cSld>
@@ -1165,7 +1971,7 @@
       </p:grpSpPr>
       <p:sp>
         <p:nvSpPr>
-          <p:cNvPr id="2" name="幻灯片图像占位符 1"/>
+          <p:cNvPr id="2" name="Slide Image Placeholder 1"/>
           <p:cNvSpPr>
             <a:spLocks noGrp="1" noRot="1" noChangeAspect="1"/>
           </p:cNvSpPr>
@@ -1177,7 +1983,7 @@
       </p:sp>
       <p:sp>
         <p:nvSpPr>
-          <p:cNvPr id="3" name="备注占位符 2"/>
+          <p:cNvPr id="3" name="Notes Placeholder 2"/>
           <p:cNvSpPr>
             <a:spLocks noGrp="1"/>
           </p:cNvSpPr>
@@ -1191,43 +1997,130 @@
           <a:lstStyle/>
           <a:p>
             <a:r>
-              <a:rPr lang="en-US" altLang="zh-CN" dirty="0" smtClean="0"/>
-              <a:t>Our</a:t>
-            </a:r>
-            <a:r>
-              <a:rPr lang="en-US" altLang="zh-CN" baseline="0" dirty="0" smtClean="0"/>
-              <a:t> authentication protocol defines how to transmit the pattern and password to the server.</a:t>
-            </a:r>
-          </a:p>
-          <a:p>
-            <a:r>
-              <a:rPr lang="en-US" altLang="zh-CN" baseline="0" dirty="0" smtClean="0"/>
-              <a:t>We had three design considerations for the protocol.</a:t>
-            </a:r>
-          </a:p>
-          <a:p>
-            <a:r>
-              <a:rPr lang="en-US" altLang="zh-CN" baseline="0" dirty="0" smtClean="0"/>
-              <a:t>First, we don’t want the password exposed in plaintext.</a:t>
-            </a:r>
-          </a:p>
-          <a:p>
-            <a:r>
-              <a:rPr lang="en-US" altLang="zh-CN" baseline="0" dirty="0" smtClean="0"/>
-              <a:t>Second, we want the timing pattern being well-protected.</a:t>
-            </a:r>
-          </a:p>
-          <a:p>
-            <a:r>
-              <a:rPr lang="en-US" altLang="zh-CN" baseline="0" dirty="0" smtClean="0"/>
-              <a:t>Third, we want to prevent the replay attack.</a:t>
-            </a:r>
-          </a:p>
-        </p:txBody>
-      </p:sp>
-      <p:sp>
-        <p:nvSpPr>
-          <p:cNvPr id="4" name="灯片编号占位符 3"/>
+              <a:rPr lang="en-US" altLang="ko-KR" dirty="0" smtClean="0"/>
+              <a:t>My part is pattern matching</a:t>
+            </a:r>
+            <a:r>
+              <a:rPr lang="en-US" altLang="ko-KR" baseline="0" dirty="0" smtClean="0"/>
+              <a:t> algorithm for detecting novelty.</a:t>
+            </a:r>
+          </a:p>
+          <a:p>
+            <a:r>
+              <a:rPr lang="en-US" altLang="ko-KR" baseline="0" dirty="0" smtClean="0"/>
+              <a:t>Given a n characters password, the pattern is an array consists of intervals and duration of </a:t>
+            </a:r>
+            <a:r>
+              <a:rPr lang="en-US" altLang="ko-KR" baseline="0" dirty="0" err="1" smtClean="0"/>
+              <a:t>keystorkes</a:t>
+            </a:r>
+            <a:r>
+              <a:rPr lang="en-US" altLang="ko-KR" baseline="0" dirty="0" smtClean="0"/>
+              <a:t>.</a:t>
+            </a:r>
+          </a:p>
+          <a:p>
+            <a:r>
+              <a:rPr lang="en-US" altLang="ko-KR" dirty="0" smtClean="0"/>
+              <a:t>So, a</a:t>
+            </a:r>
+            <a:r>
+              <a:rPr lang="en-US" altLang="ko-KR" baseline="0" dirty="0" smtClean="0"/>
+              <a:t> pattern can be regarded as a point in 2n-1 dimensional space.</a:t>
+            </a:r>
+          </a:p>
+          <a:p>
+            <a:r>
+              <a:rPr lang="en-US" altLang="ko-KR" baseline="0" dirty="0" smtClean="0"/>
+              <a:t>For example, the pattern in the picture is 1</a:t>
+            </a:r>
+            <a:r>
+              <a:rPr lang="en-US" altLang="ko-KR" baseline="30000" dirty="0" smtClean="0"/>
+              <a:t>st</a:t>
+            </a:r>
+            <a:r>
+              <a:rPr lang="en-US" altLang="ko-KR" baseline="0" dirty="0" smtClean="0"/>
+              <a:t> duration, 1</a:t>
+            </a:r>
+            <a:r>
+              <a:rPr lang="en-US" altLang="ko-KR" baseline="30000" dirty="0" smtClean="0"/>
+              <a:t>st</a:t>
+            </a:r>
+            <a:r>
+              <a:rPr lang="en-US" altLang="ko-KR" baseline="0" dirty="0" smtClean="0"/>
+              <a:t> interval, 2</a:t>
+            </a:r>
+            <a:r>
+              <a:rPr lang="en-US" altLang="ko-KR" baseline="30000" dirty="0" smtClean="0"/>
+              <a:t>nd</a:t>
+            </a:r>
+            <a:r>
+              <a:rPr lang="en-US" altLang="ko-KR" baseline="0" dirty="0" smtClean="0"/>
+              <a:t> duration, 2</a:t>
+            </a:r>
+            <a:r>
+              <a:rPr lang="en-US" altLang="ko-KR" baseline="30000" dirty="0" smtClean="0"/>
+              <a:t>nd</a:t>
+            </a:r>
+            <a:r>
+              <a:rPr lang="en-US" altLang="ko-KR" baseline="0" dirty="0" smtClean="0"/>
+              <a:t> interval, and 3</a:t>
+            </a:r>
+            <a:r>
+              <a:rPr lang="en-US" altLang="ko-KR" baseline="30000" dirty="0" smtClean="0"/>
+              <a:t>rd</a:t>
+            </a:r>
+            <a:r>
+              <a:rPr lang="en-US" altLang="ko-KR" baseline="0" dirty="0" smtClean="0"/>
+              <a:t> duration.</a:t>
+            </a:r>
+          </a:p>
+          <a:p>
+            <a:r>
+              <a:rPr lang="en-US" altLang="ko-KR" baseline="0" dirty="0" smtClean="0"/>
+              <a:t>By doing so, the similarity can be measured by distance between two points.</a:t>
+            </a:r>
+          </a:p>
+          <a:p>
+            <a:r>
+              <a:rPr lang="en-US" altLang="ko-KR" baseline="0" dirty="0" smtClean="0"/>
+              <a:t>Actually, in other researches, the interval is from released to pressed timing, so negative values exists.</a:t>
+            </a:r>
+          </a:p>
+          <a:p>
+            <a:r>
+              <a:rPr lang="en-US" altLang="ko-KR" baseline="0" dirty="0" smtClean="0"/>
+              <a:t>However, we use between key pressed and pressed timing as interval.</a:t>
+            </a:r>
+          </a:p>
+          <a:p>
+            <a:r>
+              <a:rPr lang="en-US" altLang="ko-KR" baseline="0" dirty="0" smtClean="0"/>
+              <a:t>So, there should be only positive values and it will make the precision doubled with the same data size.</a:t>
+            </a:r>
+          </a:p>
+          <a:p>
+            <a:r>
+              <a:rPr lang="en-US" altLang="ko-KR" dirty="0" smtClean="0"/>
+              <a:t>We</a:t>
+            </a:r>
+            <a:r>
+              <a:rPr lang="en-US" altLang="ko-KR" baseline="0" dirty="0" smtClean="0"/>
+              <a:t> normalized timing data by dividing by the maximum timing values because the timing range varies depending on users.</a:t>
+            </a:r>
+          </a:p>
+          <a:p>
+            <a:r>
+              <a:rPr lang="en-US" altLang="ko-KR" baseline="0" dirty="0" smtClean="0"/>
+              <a:t>The patterns are also normalized in dimensions because the length of each user’s pattern is different.</a:t>
+            </a:r>
+            <a:endParaRPr lang="ko-KR" altLang="en-US" dirty="0"/>
+          </a:p>
+        </p:txBody>
+      </p:sp>
+      <p:sp>
+        <p:nvSpPr>
+          <p:cNvPr id="4" name="Slide Number Placeholder 3"/>
           <p:cNvSpPr>
             <a:spLocks noGrp="1"/>
           </p:cNvSpPr>
@@ -1242,7 +2135,7 @@
           <a:p>
             <a:fld id="{DA8CEE05-2CC8-4BE2-9CB7-F5328E3659FA}" type="slidenum">
               <a:rPr lang="en-US" smtClean="0"/>
-              <a:t>13</a:t>
+              <a:t>6</a:t>
             </a:fld>
             <a:endParaRPr lang="en-US"/>
           </a:p>
@@ -1251,7 +2144,7 @@
     </p:spTree>
     <p:extLst>
       <p:ext uri="{BB962C8B-B14F-4D97-AF65-F5344CB8AC3E}">
-        <p14:creationId xmlns:p14="http://schemas.microsoft.com/office/powerpoint/2010/main" val="910549197"/>
+        <p14:creationId xmlns:p14="http://schemas.microsoft.com/office/powerpoint/2010/main" val="3644363123"/>
       </p:ext>
     </p:extLst>
   </p:cSld>
@@ -1280,7 +2173,7 @@
       </p:grpSpPr>
       <p:sp>
         <p:nvSpPr>
-          <p:cNvPr id="2" name="幻灯片图像占位符 1"/>
+          <p:cNvPr id="2" name="Slide Image Placeholder 1"/>
           <p:cNvSpPr>
             <a:spLocks noGrp="1" noRot="1" noChangeAspect="1"/>
           </p:cNvSpPr>
@@ -1292,7 +2185,7 @@
       </p:sp>
       <p:sp>
         <p:nvSpPr>
-          <p:cNvPr id="3" name="备注占位符 2"/>
+          <p:cNvPr id="3" name="Notes Placeholder 2"/>
           <p:cNvSpPr>
             <a:spLocks noGrp="1"/>
           </p:cNvSpPr>
@@ -1306,53 +2199,112 @@
           <a:lstStyle/>
           <a:p>
             <a:r>
-              <a:rPr lang="en-US" altLang="zh-CN" dirty="0" smtClean="0"/>
-              <a:t>Here is how we meet the design</a:t>
-            </a:r>
-            <a:r>
-              <a:rPr lang="en-US" altLang="zh-CN" baseline="0" dirty="0" smtClean="0"/>
-              <a:t> goals. We use this structure to send the timing pattern to the server.</a:t>
-            </a:r>
-          </a:p>
-          <a:p>
-            <a:r>
-              <a:rPr lang="en-US" altLang="zh-CN" baseline="0" dirty="0" smtClean="0"/>
-              <a:t>The key is the AES encryption key. It is generated from the password.</a:t>
-            </a:r>
-          </a:p>
-          <a:p>
-            <a:r>
-              <a:rPr lang="en-US" altLang="zh-CN" baseline="0" dirty="0" smtClean="0"/>
-              <a:t>The pattern is the timing pattern, encoded into a JSON string.</a:t>
-            </a:r>
-          </a:p>
-          <a:p>
-            <a:r>
-              <a:rPr lang="en-US" altLang="zh-CN" baseline="0" dirty="0" smtClean="0"/>
-              <a:t>We concatenate pattern with a timestamp. And compute a hash of the two parts.</a:t>
-            </a:r>
-          </a:p>
-          <a:p>
-            <a:r>
-              <a:rPr lang="en-US" altLang="zh-CN" baseline="0" dirty="0" smtClean="0"/>
-              <a:t>Then we use the generated key to encrypt the pattern as well as the hash and the timestamp, and send it to the server.</a:t>
-            </a:r>
-          </a:p>
-          <a:p>
-            <a:endParaRPr lang="en-US" altLang="zh-CN" baseline="0" dirty="0" smtClean="0"/>
-          </a:p>
-          <a:p>
-            <a:r>
-              <a:rPr lang="en-US" altLang="zh-CN" baseline="0" dirty="0" smtClean="0"/>
-              <a:t>As you can see, the password is not being transmitted in any form in the message. And the pattern is protected by AES. And because we use the timestamp, the replay attack is also prevented. All of the three goals are met.</a:t>
-            </a:r>
-            <a:endParaRPr lang="zh-CN" altLang="en-US" dirty="0"/>
-          </a:p>
-        </p:txBody>
-      </p:sp>
-      <p:sp>
-        <p:nvSpPr>
-          <p:cNvPr id="4" name="灯片编号占位符 3"/>
+              <a:rPr lang="en-US" altLang="ko-KR" dirty="0" smtClean="0"/>
+              <a:t>There</a:t>
+            </a:r>
+            <a:r>
+              <a:rPr lang="en-US" altLang="ko-KR" baseline="0" dirty="0" smtClean="0"/>
+              <a:t> are many algorithms to detect outliers, such as geometric distance, machine learning, neural network, and genetic algorithm.</a:t>
+            </a:r>
+          </a:p>
+          <a:p>
+            <a:r>
+              <a:rPr lang="en-US" altLang="ko-KR" baseline="0" dirty="0" smtClean="0"/>
+              <a:t>We selected common three algorithms and compared them.</a:t>
+            </a:r>
+          </a:p>
+          <a:p>
+            <a:endParaRPr lang="en-US" altLang="ko-KR" baseline="0" dirty="0" smtClean="0"/>
+          </a:p>
+          <a:p>
+            <a:r>
+              <a:rPr lang="en-US" altLang="ko-KR" baseline="0" dirty="0" smtClean="0"/>
+              <a:t>First, find nearest neighbor and measure the distance from it.</a:t>
+            </a:r>
+          </a:p>
+          <a:p>
+            <a:r>
+              <a:rPr lang="en-US" altLang="ko-KR" baseline="0" dirty="0" smtClean="0"/>
+              <a:t>It is intuitive and needs computed fast. And works with small number of samples.</a:t>
+            </a:r>
+          </a:p>
+          <a:p>
+            <a:r>
+              <a:rPr lang="en-US" altLang="ko-KR" baseline="0" dirty="0" smtClean="0"/>
+              <a:t>But, it is not good for sparsely distributed samples.</a:t>
+            </a:r>
+          </a:p>
+          <a:p>
+            <a:endParaRPr lang="en-US" altLang="ko-KR" baseline="0" dirty="0" smtClean="0"/>
+          </a:p>
+          <a:p>
+            <a:r>
+              <a:rPr lang="en-US" altLang="ko-KR" dirty="0" smtClean="0"/>
+              <a:t>Second, </a:t>
+            </a:r>
+            <a:r>
+              <a:rPr lang="en-US" altLang="ko-KR" dirty="0" err="1" smtClean="0"/>
+              <a:t>Mahalanobis</a:t>
+            </a:r>
+            <a:r>
+              <a:rPr lang="en-US" altLang="ko-KR" dirty="0" smtClean="0"/>
+              <a:t> distance is</a:t>
+            </a:r>
+            <a:r>
+              <a:rPr lang="en-US" altLang="ko-KR" baseline="0" dirty="0" smtClean="0"/>
+              <a:t> used.</a:t>
+            </a:r>
+          </a:p>
+          <a:p>
+            <a:r>
+              <a:rPr lang="en-US" altLang="ko-KR" baseline="0" dirty="0" smtClean="0"/>
+              <a:t>By the method, we measured the distance from a point to cluster.</a:t>
+            </a:r>
+          </a:p>
+          <a:p>
+            <a:r>
+              <a:rPr lang="en-US" altLang="ko-KR" baseline="0" dirty="0" smtClean="0"/>
+              <a:t>It shows how many standard deviation between a point and the mean of a cluster.</a:t>
+            </a:r>
+          </a:p>
+          <a:p>
+            <a:r>
+              <a:rPr lang="en-US" altLang="ko-KR" baseline="0" dirty="0" smtClean="0"/>
+              <a:t>So, even if points are sparsely distributed, it works well.</a:t>
+            </a:r>
+          </a:p>
+          <a:p>
+            <a:r>
+              <a:rPr lang="en-US" altLang="ko-KR" baseline="0" dirty="0" smtClean="0"/>
+              <a:t>However, the performance is low for long passwords.</a:t>
+            </a:r>
+          </a:p>
+          <a:p>
+            <a:endParaRPr lang="en-US" altLang="ko-KR" baseline="0" dirty="0" smtClean="0"/>
+          </a:p>
+          <a:p>
+            <a:r>
+              <a:rPr lang="en-US" altLang="ko-KR" baseline="0" dirty="0" smtClean="0"/>
+              <a:t>Finally, One-Class SVMs which is one of the machine learning algorithms is selected.</a:t>
+            </a:r>
+          </a:p>
+          <a:p>
+            <a:r>
+              <a:rPr lang="en-US" altLang="ko-KR" baseline="0" dirty="0" smtClean="0"/>
+              <a:t>It shows good performance but needs a lot of samples for high accuracy.</a:t>
+            </a:r>
+          </a:p>
+          <a:p>
+            <a:endParaRPr lang="en-US" altLang="ko-KR" baseline="0" dirty="0" smtClean="0"/>
+          </a:p>
+          <a:p>
+            <a:endParaRPr lang="ko-KR" altLang="en-US" dirty="0"/>
+          </a:p>
+        </p:txBody>
+      </p:sp>
+      <p:sp>
+        <p:nvSpPr>
+          <p:cNvPr id="4" name="Slide Number Placeholder 3"/>
           <p:cNvSpPr>
             <a:spLocks noGrp="1"/>
           </p:cNvSpPr>
@@ -1367,7 +2319,7 @@
           <a:p>
             <a:fld id="{DA8CEE05-2CC8-4BE2-9CB7-F5328E3659FA}" type="slidenum">
               <a:rPr lang="en-US" smtClean="0"/>
-              <a:t>14</a:t>
+              <a:t>7</a:t>
             </a:fld>
             <a:endParaRPr lang="en-US"/>
           </a:p>
@@ -1376,7 +2328,7 @@
     </p:spTree>
     <p:extLst>
       <p:ext uri="{BB962C8B-B14F-4D97-AF65-F5344CB8AC3E}">
-        <p14:creationId xmlns:p14="http://schemas.microsoft.com/office/powerpoint/2010/main" val="3488594575"/>
+        <p14:creationId xmlns:p14="http://schemas.microsoft.com/office/powerpoint/2010/main" val="2039524468"/>
       </p:ext>
     </p:extLst>
   </p:cSld>
@@ -1405,7 +2357,7 @@
       </p:grpSpPr>
       <p:sp>
         <p:nvSpPr>
-          <p:cNvPr id="2" name="幻灯片图像占位符 1"/>
+          <p:cNvPr id="2" name="Slide Image Placeholder 1"/>
           <p:cNvSpPr>
             <a:spLocks noGrp="1" noRot="1" noChangeAspect="1"/>
           </p:cNvSpPr>
@@ -1417,7 +2369,7 @@
       </p:sp>
       <p:sp>
         <p:nvSpPr>
-          <p:cNvPr id="3" name="备注占位符 2"/>
+          <p:cNvPr id="3" name="Notes Placeholder 2"/>
           <p:cNvSpPr>
             <a:spLocks noGrp="1"/>
           </p:cNvSpPr>
@@ -1431,79 +2383,50 @@
           <a:lstStyle/>
           <a:p>
             <a:r>
-              <a:rPr lang="en-US" altLang="zh-CN" dirty="0" smtClean="0"/>
-              <a:t>Here is a</a:t>
-            </a:r>
-            <a:r>
-              <a:rPr lang="en-US" altLang="zh-CN" baseline="0" dirty="0" smtClean="0"/>
-              <a:t> problem. How can we verify the password without transmitting it. Actually, it is implied in our design.</a:t>
-            </a:r>
-          </a:p>
-          <a:p>
-            <a:endParaRPr lang="en-US" altLang="zh-CN" baseline="0" dirty="0" smtClean="0"/>
-          </a:p>
-          <a:p>
-            <a:r>
-              <a:rPr lang="en-US" altLang="zh-CN" baseline="0" dirty="0" smtClean="0"/>
-              <a:t>When server receive the encrypted pattern, it first retrieve the password of the user from the database.</a:t>
-            </a:r>
-          </a:p>
-          <a:p>
-            <a:r>
-              <a:rPr lang="en-US" altLang="zh-CN" baseline="0" dirty="0" smtClean="0"/>
-              <a:t>Then, it generate the AES key in the same way as the frontend.</a:t>
-            </a:r>
-          </a:p>
-          <a:p>
-            <a:r>
-              <a:rPr lang="en-US" altLang="zh-CN" baseline="0" dirty="0" smtClean="0"/>
-              <a:t>Then, decrypt the message with the key.</a:t>
-            </a:r>
-          </a:p>
-          <a:p>
-            <a:r>
-              <a:rPr lang="en-US" altLang="zh-CN" baseline="0" dirty="0" smtClean="0"/>
-              <a:t>Extract the hash, the timestamp and the pattern.</a:t>
-            </a:r>
-          </a:p>
-          <a:p>
-            <a:r>
-              <a:rPr lang="en-US" altLang="zh-CN" baseline="0" dirty="0" smtClean="0"/>
-              <a:t>Compute a hash of the timestamp and the pattern,</a:t>
-            </a:r>
-          </a:p>
-          <a:p>
-            <a:r>
-              <a:rPr lang="en-US" altLang="zh-CN" baseline="0" dirty="0" smtClean="0"/>
-              <a:t>Check if the hash matches what was received.</a:t>
-            </a:r>
-          </a:p>
-          <a:p>
-            <a:r>
-              <a:rPr lang="en-US" altLang="zh-CN" baseline="0" dirty="0" smtClean="0"/>
-              <a:t>Then check if the timestamp is still valid.</a:t>
-            </a:r>
-          </a:p>
-          <a:p>
-            <a:r>
-              <a:rPr lang="en-US" altLang="zh-CN" baseline="0" dirty="0" smtClean="0"/>
-              <a:t>If so, the user is authenticated.</a:t>
-            </a:r>
-          </a:p>
-          <a:p>
-            <a:endParaRPr lang="en-US" altLang="zh-CN" baseline="0" dirty="0" smtClean="0"/>
-          </a:p>
-          <a:p>
-            <a:r>
-              <a:rPr lang="en-US" altLang="zh-CN" baseline="0" dirty="0" smtClean="0"/>
-              <a:t>The trick is that if the user provides an incorrect password, we won’t be able to decrypt the message. Therefore, the two hash cannot match. The purpose of having the hash here is to determine whether the message is decrypted correctly. So only when the correct password is provided, everything would work.</a:t>
-            </a:r>
-          </a:p>
-        </p:txBody>
-      </p:sp>
-      <p:sp>
-        <p:nvSpPr>
-          <p:cNvPr id="4" name="灯片编号占位符 3"/>
+              <a:rPr lang="en-US" altLang="ko-KR" dirty="0" smtClean="0"/>
+              <a:t>In many</a:t>
+            </a:r>
+            <a:r>
+              <a:rPr lang="en-US" altLang="ko-KR" baseline="0" dirty="0" smtClean="0"/>
+              <a:t> researches, the practical experiments are conducted but we tested in synthetic environment.</a:t>
+            </a:r>
+          </a:p>
+          <a:p>
+            <a:r>
+              <a:rPr lang="en-US" altLang="ko-KR" baseline="0" dirty="0" smtClean="0"/>
+              <a:t>Collecting real user’s patterns will be more reliable than virtual environment but it is only if it is tested for a long time with a lot of volunteers.</a:t>
+            </a:r>
+          </a:p>
+          <a:p>
+            <a:r>
+              <a:rPr lang="en-US" altLang="ko-KR" baseline="0" dirty="0" smtClean="0"/>
+              <a:t>And the data from experienced users could be biased and so densely distributed.</a:t>
+            </a:r>
+          </a:p>
+          <a:p>
+            <a:r>
+              <a:rPr lang="en-US" altLang="ko-KR" baseline="0" dirty="0" smtClean="0"/>
+              <a:t>Also, the impostor would have a pattern which means need to collect data from many imposters but in many previous studies, the imposter’s patterns generated by a few people.</a:t>
+            </a:r>
+          </a:p>
+          <a:p>
+            <a:r>
+              <a:rPr lang="en-US" altLang="ko-KR" baseline="0" dirty="0" smtClean="0"/>
+              <a:t>And  we want compare the performance of algorithms depending on variation of a user’s patterns. It should have been tested for a long period of time.</a:t>
+            </a:r>
+          </a:p>
+          <a:p>
+            <a:r>
+              <a:rPr lang="en-US" altLang="ko-KR" baseline="0" dirty="0" smtClean="0"/>
+              <a:t>So, we tried to generate reliable synthetic environment for tests.</a:t>
+            </a:r>
+            <a:endParaRPr lang="ko-KR" altLang="en-US" dirty="0"/>
+          </a:p>
+        </p:txBody>
+      </p:sp>
+      <p:sp>
+        <p:nvSpPr>
+          <p:cNvPr id="4" name="Slide Number Placeholder 3"/>
           <p:cNvSpPr>
             <a:spLocks noGrp="1"/>
           </p:cNvSpPr>
@@ -1518,7 +2441,7 @@
           <a:p>
             <a:fld id="{DA8CEE05-2CC8-4BE2-9CB7-F5328E3659FA}" type="slidenum">
               <a:rPr lang="en-US" smtClean="0"/>
-              <a:t>15</a:t>
+              <a:t>8</a:t>
             </a:fld>
             <a:endParaRPr lang="en-US"/>
           </a:p>
@@ -1527,7 +2450,132 @@
     </p:spTree>
     <p:extLst>
       <p:ext uri="{BB962C8B-B14F-4D97-AF65-F5344CB8AC3E}">
-        <p14:creationId xmlns:p14="http://schemas.microsoft.com/office/powerpoint/2010/main" val="1880353969"/>
+        <p14:creationId xmlns:p14="http://schemas.microsoft.com/office/powerpoint/2010/main" val="3170135402"/>
+      </p:ext>
+    </p:extLst>
+  </p:cSld>
+  <p:clrMapOvr>
+    <a:masterClrMapping/>
+  </p:clrMapOvr>
+</p:notes>
+</file>
+
+<file path=ppt/notesSlides/notesSlide9.xml><?xml version="1.0" encoding="utf-8"?>
+<p:notes xmlns:a="http://schemas.openxmlformats.org/drawingml/2006/main" xmlns:r="http://schemas.openxmlformats.org/officeDocument/2006/relationships" xmlns:p="http://schemas.openxmlformats.org/presentationml/2006/main">
+  <p:cSld>
+    <p:spTree>
+      <p:nvGrpSpPr>
+        <p:cNvPr id="1" name=""/>
+        <p:cNvGrpSpPr/>
+        <p:nvPr/>
+      </p:nvGrpSpPr>
+      <p:grpSpPr>
+        <a:xfrm>
+          <a:off x="0" y="0"/>
+          <a:ext cx="0" cy="0"/>
+          <a:chOff x="0" y="0"/>
+          <a:chExt cx="0" cy="0"/>
+        </a:xfrm>
+      </p:grpSpPr>
+      <p:sp>
+        <p:nvSpPr>
+          <p:cNvPr id="2" name="Slide Image Placeholder 1"/>
+          <p:cNvSpPr>
+            <a:spLocks noGrp="1" noRot="1" noChangeAspect="1"/>
+          </p:cNvSpPr>
+          <p:nvPr>
+            <p:ph type="sldImg"/>
+          </p:nvPr>
+        </p:nvSpPr>
+        <p:spPr/>
+      </p:sp>
+      <p:sp>
+        <p:nvSpPr>
+          <p:cNvPr id="3" name="Notes Placeholder 2"/>
+          <p:cNvSpPr>
+            <a:spLocks noGrp="1"/>
+          </p:cNvSpPr>
+          <p:nvPr>
+            <p:ph type="body" idx="1"/>
+          </p:nvPr>
+        </p:nvSpPr>
+        <p:spPr/>
+        <p:txBody>
+          <a:bodyPr/>
+          <a:lstStyle/>
+          <a:p>
+            <a:r>
+              <a:rPr lang="en-US" altLang="ko-KR" dirty="0" smtClean="0"/>
+              <a:t>Here’s the process.</a:t>
+            </a:r>
+          </a:p>
+          <a:p>
+            <a:endParaRPr lang="en-US" altLang="ko-KR" dirty="0" smtClean="0"/>
+          </a:p>
+          <a:p>
+            <a:r>
+              <a:rPr lang="en-US" altLang="ko-KR" dirty="0" smtClean="0"/>
+              <a:t>First, se</a:t>
+            </a:r>
+            <a:r>
+              <a:rPr lang="en-US" altLang="ko-KR" baseline="0" dirty="0" smtClean="0"/>
+              <a:t>t a pattern</a:t>
+            </a:r>
+          </a:p>
+          <a:p>
+            <a:r>
+              <a:rPr lang="en-US" altLang="ko-KR" baseline="0" dirty="0" smtClean="0"/>
+              <a:t>And generate evenly distributed patterns for imposters.</a:t>
+            </a:r>
+          </a:p>
+          <a:p>
+            <a:r>
+              <a:rPr lang="en-US" altLang="ko-KR" baseline="0" dirty="0" smtClean="0"/>
+              <a:t>And select a variation of patterns for a user.</a:t>
+            </a:r>
+          </a:p>
+          <a:p>
+            <a:r>
+              <a:rPr lang="en-US" altLang="ko-KR" baseline="0" dirty="0" smtClean="0"/>
+              <a:t>And generate patterns satisfying the condition and normally distributed.</a:t>
+            </a:r>
+          </a:p>
+          <a:p>
+            <a:r>
+              <a:rPr lang="en-US" altLang="ko-KR" baseline="0" dirty="0" smtClean="0"/>
+              <a:t>Finally, training data with the user’s patterns and predict for all points.</a:t>
+            </a:r>
+            <a:endParaRPr lang="ko-KR" altLang="en-US" dirty="0"/>
+          </a:p>
+        </p:txBody>
+      </p:sp>
+      <p:sp>
+        <p:nvSpPr>
+          <p:cNvPr id="4" name="Slide Number Placeholder 3"/>
+          <p:cNvSpPr>
+            <a:spLocks noGrp="1"/>
+          </p:cNvSpPr>
+          <p:nvPr>
+            <p:ph type="sldNum" sz="quarter" idx="10"/>
+          </p:nvPr>
+        </p:nvSpPr>
+        <p:spPr/>
+        <p:txBody>
+          <a:bodyPr/>
+          <a:lstStyle/>
+          <a:p>
+            <a:fld id="{DA8CEE05-2CC8-4BE2-9CB7-F5328E3659FA}" type="slidenum">
+              <a:rPr lang="en-US" smtClean="0"/>
+              <a:t>9</a:t>
+            </a:fld>
+            <a:endParaRPr lang="en-US"/>
+          </a:p>
+        </p:txBody>
+      </p:sp>
+    </p:spTree>
+    <p:extLst>
+      <p:ext uri="{BB962C8B-B14F-4D97-AF65-F5344CB8AC3E}">
+        <p14:creationId xmlns:p14="http://schemas.microsoft.com/office/powerpoint/2010/main" val="1778718889"/>
       </p:ext>
     </p:extLst>
   </p:cSld>
@@ -5301,6 +6349,36 @@
           <a:chExt cx="0" cy="0"/>
         </a:xfrm>
       </p:grpSpPr>
+      <p:pic>
+        <p:nvPicPr>
+          <p:cNvPr id="7" name="Picture 6"/>
+          <p:cNvPicPr>
+            <a:picLocks noChangeAspect="1"/>
+          </p:cNvPicPr>
+          <p:nvPr/>
+        </p:nvPicPr>
+        <p:blipFill>
+          <a:blip r:embed="rId3">
+            <a:extLst>
+              <a:ext uri="{28A0092B-C50C-407E-A947-70E740481C1C}">
+                <a14:useLocalDpi xmlns:a14="http://schemas.microsoft.com/office/drawing/2010/main" val="0"/>
+              </a:ext>
+            </a:extLst>
+          </a:blip>
+          <a:stretch>
+            <a:fillRect/>
+          </a:stretch>
+        </p:blipFill>
+        <p:spPr>
+          <a:xfrm>
+            <a:off x="3537284" y="2652962"/>
+            <a:ext cx="5606717" cy="4205038"/>
+          </a:xfrm>
+          <a:prstGeom prst="rect">
+            <a:avLst/>
+          </a:prstGeom>
+        </p:spPr>
+      </p:pic>
       <p:sp>
         <p:nvSpPr>
           <p:cNvPr id="2" name="标题 1"/>
@@ -5418,36 +6496,6 @@
           </a:p>
         </p:txBody>
       </p:sp>
-      <p:pic>
-        <p:nvPicPr>
-          <p:cNvPr id="6" name="Picture 5"/>
-          <p:cNvPicPr>
-            <a:picLocks noChangeAspect="1"/>
-          </p:cNvPicPr>
-          <p:nvPr/>
-        </p:nvPicPr>
-        <p:blipFill>
-          <a:blip r:embed="rId2">
-            <a:extLst>
-              <a:ext uri="{28A0092B-C50C-407E-A947-70E740481C1C}">
-                <a14:useLocalDpi xmlns:a14="http://schemas.microsoft.com/office/drawing/2010/main" val="0"/>
-              </a:ext>
-            </a:extLst>
-          </a:blip>
-          <a:stretch>
-            <a:fillRect/>
-          </a:stretch>
-        </p:blipFill>
-        <p:spPr>
-          <a:xfrm>
-            <a:off x="3586071" y="2878551"/>
-            <a:ext cx="5305933" cy="3979449"/>
-          </a:xfrm>
-          <a:prstGeom prst="rect">
-            <a:avLst/>
-          </a:prstGeom>
-        </p:spPr>
-      </p:pic>
       <p:sp>
         <p:nvSpPr>
           <p:cNvPr id="106" name="Content Placeholder 2"/>
@@ -5714,125 +6762,16 @@
           <a:chExt cx="0" cy="0"/>
         </a:xfrm>
       </p:grpSpPr>
-      <p:sp>
-        <p:nvSpPr>
-          <p:cNvPr id="2" name="标题 1"/>
-          <p:cNvSpPr>
-            <a:spLocks noGrp="1"/>
-          </p:cNvSpPr>
-          <p:nvPr>
-            <p:ph type="title"/>
-          </p:nvPr>
-        </p:nvSpPr>
-        <p:spPr/>
-        <p:txBody>
-          <a:bodyPr/>
-          <a:lstStyle/>
-          <a:p>
-            <a:r>
-              <a:rPr lang="en-US" altLang="zh-CN" dirty="0" smtClean="0"/>
-              <a:t>Pattern Matching</a:t>
-            </a:r>
-            <a:endParaRPr lang="zh-CN" altLang="en-US" dirty="0"/>
-          </a:p>
-        </p:txBody>
-      </p:sp>
-      <p:sp>
-        <p:nvSpPr>
-          <p:cNvPr id="3" name="内容占位符 2"/>
-          <p:cNvSpPr>
-            <a:spLocks noGrp="1"/>
-          </p:cNvSpPr>
-          <p:nvPr>
-            <p:ph idx="1"/>
-          </p:nvPr>
-        </p:nvSpPr>
-        <p:spPr>
-          <a:xfrm>
-            <a:off x="251995" y="1268999"/>
-            <a:ext cx="8807783" cy="5336338"/>
-          </a:xfrm>
-        </p:spPr>
-        <p:txBody>
-          <a:bodyPr>
-            <a:normAutofit/>
-          </a:bodyPr>
-          <a:lstStyle/>
-          <a:p>
-            <a:r>
-              <a:rPr lang="en-US" altLang="ko-KR" dirty="0" smtClean="0"/>
-              <a:t>Test Result 2 – Patterns are proportional</a:t>
-            </a:r>
-          </a:p>
-          <a:p>
-            <a:pPr lvl="1">
-              <a:spcBef>
-                <a:spcPts val="1000"/>
-              </a:spcBef>
-              <a:spcAft>
-                <a:spcPts val="0"/>
-              </a:spcAft>
-              <a:buClrTx/>
-            </a:pPr>
-            <a:r>
-              <a:rPr lang="en-US" altLang="zh-CN" dirty="0" smtClean="0"/>
-              <a:t>e.g.) [20, 40, 60, 80], [10, 20, 30, 40], [30</a:t>
-            </a:r>
-            <a:r>
-              <a:rPr lang="en-US" altLang="zh-CN" dirty="0"/>
-              <a:t>, </a:t>
-            </a:r>
-            <a:r>
-              <a:rPr lang="en-US" altLang="zh-CN" dirty="0" smtClean="0"/>
-              <a:t>60</a:t>
-            </a:r>
-            <a:r>
-              <a:rPr lang="en-US" altLang="zh-CN" dirty="0"/>
-              <a:t>, </a:t>
-            </a:r>
-            <a:r>
-              <a:rPr lang="en-US" altLang="zh-CN" dirty="0" smtClean="0"/>
-              <a:t>90</a:t>
-            </a:r>
-            <a:r>
-              <a:rPr lang="en-US" altLang="zh-CN" dirty="0"/>
-              <a:t>, </a:t>
-            </a:r>
-            <a:r>
-              <a:rPr lang="en-US" altLang="zh-CN" dirty="0" smtClean="0"/>
-              <a:t>120]</a:t>
-            </a:r>
-          </a:p>
-          <a:p>
-            <a:pPr lvl="1">
-              <a:spcBef>
-                <a:spcPts val="1000"/>
-              </a:spcBef>
-              <a:spcAft>
-                <a:spcPts val="0"/>
-              </a:spcAft>
-              <a:buClrTx/>
-            </a:pPr>
-            <a:r>
-              <a:rPr lang="en-US" altLang="zh-CN" dirty="0" smtClean="0"/>
-              <a:t>Users would type faster or slower depending on the experience</a:t>
-            </a:r>
-          </a:p>
-          <a:p>
-            <a:endParaRPr lang="zh-CN" altLang="en-US" dirty="0"/>
-          </a:p>
-        </p:txBody>
-      </p:sp>
       <p:pic>
         <p:nvPicPr>
-          <p:cNvPr id="4" name="Picture 3"/>
+          <p:cNvPr id="5" name="Picture 4"/>
           <p:cNvPicPr>
             <a:picLocks noChangeAspect="1"/>
           </p:cNvPicPr>
           <p:nvPr/>
         </p:nvPicPr>
         <p:blipFill>
-          <a:blip r:embed="rId2">
+          <a:blip r:embed="rId3">
             <a:extLst>
               <a:ext uri="{28A0092B-C50C-407E-A947-70E740481C1C}">
                 <a14:useLocalDpi xmlns:a14="http://schemas.microsoft.com/office/drawing/2010/main" val="0"/>
@@ -5845,14 +6784,123 @@
         </p:blipFill>
         <p:spPr>
           <a:xfrm>
-            <a:off x="1919037" y="2878556"/>
-            <a:ext cx="5305926" cy="3979444"/>
+            <a:off x="1738559" y="2607839"/>
+            <a:ext cx="5666881" cy="4250161"/>
           </a:xfrm>
           <a:prstGeom prst="rect">
             <a:avLst/>
           </a:prstGeom>
         </p:spPr>
       </p:pic>
+      <p:sp>
+        <p:nvSpPr>
+          <p:cNvPr id="2" name="标题 1"/>
+          <p:cNvSpPr>
+            <a:spLocks noGrp="1"/>
+          </p:cNvSpPr>
+          <p:nvPr>
+            <p:ph type="title"/>
+          </p:nvPr>
+        </p:nvSpPr>
+        <p:spPr/>
+        <p:txBody>
+          <a:bodyPr/>
+          <a:lstStyle/>
+          <a:p>
+            <a:r>
+              <a:rPr lang="en-US" altLang="zh-CN" dirty="0" smtClean="0"/>
+              <a:t>Pattern Matching</a:t>
+            </a:r>
+            <a:endParaRPr lang="zh-CN" altLang="en-US" dirty="0"/>
+          </a:p>
+        </p:txBody>
+      </p:sp>
+      <p:sp>
+        <p:nvSpPr>
+          <p:cNvPr id="3" name="内容占位符 2"/>
+          <p:cNvSpPr>
+            <a:spLocks noGrp="1"/>
+          </p:cNvSpPr>
+          <p:nvPr>
+            <p:ph idx="1"/>
+          </p:nvPr>
+        </p:nvSpPr>
+        <p:spPr>
+          <a:xfrm>
+            <a:off x="251995" y="1268999"/>
+            <a:ext cx="8807783" cy="5336338"/>
+          </a:xfrm>
+        </p:spPr>
+        <p:txBody>
+          <a:bodyPr>
+            <a:normAutofit/>
+          </a:bodyPr>
+          <a:lstStyle/>
+          <a:p>
+            <a:r>
+              <a:rPr lang="en-US" altLang="ko-KR" dirty="0" smtClean="0"/>
+              <a:t>Test Result 2 – Patterns are proportional</a:t>
+            </a:r>
+          </a:p>
+          <a:p>
+            <a:pPr lvl="1">
+              <a:spcBef>
+                <a:spcPts val="1000"/>
+              </a:spcBef>
+              <a:spcAft>
+                <a:spcPts val="0"/>
+              </a:spcAft>
+              <a:buClrTx/>
+            </a:pPr>
+            <a:r>
+              <a:rPr lang="en-US" altLang="zh-CN" dirty="0" smtClean="0"/>
+              <a:t>e.g.) [20, 40, 60, 80], [10, 20, 30, 40], [30</a:t>
+            </a:r>
+            <a:r>
+              <a:rPr lang="en-US" altLang="zh-CN" dirty="0"/>
+              <a:t>, </a:t>
+            </a:r>
+            <a:r>
+              <a:rPr lang="en-US" altLang="zh-CN" dirty="0" smtClean="0"/>
+              <a:t>60</a:t>
+            </a:r>
+            <a:r>
+              <a:rPr lang="en-US" altLang="zh-CN" dirty="0"/>
+              <a:t>, </a:t>
+            </a:r>
+            <a:r>
+              <a:rPr lang="en-US" altLang="zh-CN" dirty="0" smtClean="0"/>
+              <a:t>90</a:t>
+            </a:r>
+            <a:r>
+              <a:rPr lang="en-US" altLang="zh-CN" dirty="0"/>
+              <a:t>, </a:t>
+            </a:r>
+            <a:r>
+              <a:rPr lang="en-US" altLang="zh-CN" dirty="0" smtClean="0"/>
+              <a:t>120]</a:t>
+            </a:r>
+          </a:p>
+          <a:p>
+            <a:pPr lvl="1">
+              <a:spcBef>
+                <a:spcPts val="1000"/>
+              </a:spcBef>
+              <a:spcAft>
+                <a:spcPts val="0"/>
+              </a:spcAft>
+              <a:buClrTx/>
+            </a:pPr>
+            <a:r>
+              <a:rPr lang="en-US" altLang="zh-CN" dirty="0" smtClean="0"/>
+              <a:t>Users would type faster or slower depending on the experience</a:t>
+            </a:r>
+          </a:p>
+          <a:p>
+            <a:endParaRPr lang="zh-CN" altLang="en-US" dirty="0"/>
+          </a:p>
+        </p:txBody>
+      </p:sp>
     </p:spTree>
     <p:extLst>
       <p:ext uri="{BB962C8B-B14F-4D97-AF65-F5344CB8AC3E}">
@@ -5890,86 +6938,16 @@
           <a:chExt cx="0" cy="0"/>
         </a:xfrm>
       </p:grpSpPr>
-      <p:sp>
-        <p:nvSpPr>
-          <p:cNvPr id="2" name="标题 1"/>
-          <p:cNvSpPr>
-            <a:spLocks noGrp="1"/>
-          </p:cNvSpPr>
-          <p:nvPr>
-            <p:ph type="title"/>
-          </p:nvPr>
-        </p:nvSpPr>
-        <p:spPr/>
-        <p:txBody>
-          <a:bodyPr/>
-          <a:lstStyle/>
-          <a:p>
-            <a:r>
-              <a:rPr lang="en-US" altLang="zh-CN" dirty="0" smtClean="0"/>
-              <a:t>Pattern Matching</a:t>
-            </a:r>
-            <a:endParaRPr lang="zh-CN" altLang="en-US" dirty="0"/>
-          </a:p>
-        </p:txBody>
-      </p:sp>
-      <p:sp>
-        <p:nvSpPr>
-          <p:cNvPr id="3" name="内容占位符 2"/>
-          <p:cNvSpPr>
-            <a:spLocks noGrp="1"/>
-          </p:cNvSpPr>
-          <p:nvPr>
-            <p:ph idx="1"/>
-          </p:nvPr>
-        </p:nvSpPr>
-        <p:spPr>
-          <a:xfrm>
-            <a:off x="251995" y="1268999"/>
-            <a:ext cx="8807783" cy="5336338"/>
-          </a:xfrm>
-        </p:spPr>
-        <p:txBody>
-          <a:bodyPr>
-            <a:normAutofit/>
-          </a:bodyPr>
-          <a:lstStyle/>
-          <a:p>
-            <a:r>
-              <a:rPr lang="en-US" altLang="ko-KR" dirty="0" smtClean="0"/>
-              <a:t>Test Result 3 – Multiple clusters</a:t>
-            </a:r>
-          </a:p>
-          <a:p>
-            <a:pPr lvl="1">
-              <a:spcBef>
-                <a:spcPts val="1000"/>
-              </a:spcBef>
-              <a:spcAft>
-                <a:spcPts val="0"/>
-              </a:spcAft>
-              <a:buClrTx/>
-            </a:pPr>
-            <a:r>
-              <a:rPr lang="en-US" altLang="zh-CN" dirty="0" smtClean="0"/>
-              <a:t>User’s pattern may form multiple clusters because of different types of devices such as, mobile and laptop keyboard.</a:t>
-            </a:r>
-          </a:p>
-          <a:p>
-            <a:endParaRPr lang="zh-CN" altLang="en-US" dirty="0"/>
-          </a:p>
-        </p:txBody>
-      </p:sp>
       <p:pic>
         <p:nvPicPr>
-          <p:cNvPr id="4" name="Picture 3"/>
+          <p:cNvPr id="5" name="Picture 4"/>
           <p:cNvPicPr>
             <a:picLocks noChangeAspect="1"/>
           </p:cNvPicPr>
           <p:nvPr/>
         </p:nvPicPr>
         <p:blipFill>
-          <a:blip r:embed="rId2">
+          <a:blip r:embed="rId3">
             <a:extLst>
               <a:ext uri="{28A0092B-C50C-407E-A947-70E740481C1C}">
                 <a14:useLocalDpi xmlns:a14="http://schemas.microsoft.com/office/drawing/2010/main" val="0"/>
@@ -5982,14 +6960,84 @@
         </p:blipFill>
         <p:spPr>
           <a:xfrm>
-            <a:off x="1864553" y="2695074"/>
-            <a:ext cx="5550568" cy="4162926"/>
+            <a:off x="1588176" y="2382253"/>
+            <a:ext cx="5967663" cy="4475747"/>
           </a:xfrm>
           <a:prstGeom prst="rect">
             <a:avLst/>
           </a:prstGeom>
         </p:spPr>
       </p:pic>
+      <p:sp>
+        <p:nvSpPr>
+          <p:cNvPr id="2" name="标题 1"/>
+          <p:cNvSpPr>
+            <a:spLocks noGrp="1"/>
+          </p:cNvSpPr>
+          <p:nvPr>
+            <p:ph type="title"/>
+          </p:nvPr>
+        </p:nvSpPr>
+        <p:spPr/>
+        <p:txBody>
+          <a:bodyPr/>
+          <a:lstStyle/>
+          <a:p>
+            <a:r>
+              <a:rPr lang="en-US" altLang="zh-CN" dirty="0" smtClean="0"/>
+              <a:t>Pattern Matching</a:t>
+            </a:r>
+            <a:endParaRPr lang="zh-CN" altLang="en-US" dirty="0"/>
+          </a:p>
+        </p:txBody>
+      </p:sp>
+      <p:sp>
+        <p:nvSpPr>
+          <p:cNvPr id="3" name="内容占位符 2"/>
+          <p:cNvSpPr>
+            <a:spLocks noGrp="1"/>
+          </p:cNvSpPr>
+          <p:nvPr>
+            <p:ph idx="1"/>
+          </p:nvPr>
+        </p:nvSpPr>
+        <p:spPr>
+          <a:xfrm>
+            <a:off x="251995" y="1268999"/>
+            <a:ext cx="8807783" cy="5336338"/>
+          </a:xfrm>
+        </p:spPr>
+        <p:txBody>
+          <a:bodyPr>
+            <a:normAutofit/>
+          </a:bodyPr>
+          <a:lstStyle/>
+          <a:p>
+            <a:r>
+              <a:rPr lang="en-US" altLang="ko-KR" dirty="0" smtClean="0"/>
+              <a:t>Test Result 3 – Multiple clusters</a:t>
+            </a:r>
+          </a:p>
+          <a:p>
+            <a:pPr lvl="1">
+              <a:spcBef>
+                <a:spcPts val="1000"/>
+              </a:spcBef>
+              <a:spcAft>
+                <a:spcPts val="0"/>
+              </a:spcAft>
+              <a:buClrTx/>
+            </a:pPr>
+            <a:r>
+              <a:rPr lang="en-US" altLang="zh-CN" dirty="0" smtClean="0"/>
+              <a:t>User’s pattern may form multiple clusters because of different types of devices such as, mobile and laptop keyboard.</a:t>
+            </a:r>
+          </a:p>
+          <a:p>
+            <a:endParaRPr lang="zh-CN" altLang="en-US" dirty="0"/>
+          </a:p>
+        </p:txBody>
+      </p:sp>
     </p:spTree>
     <p:extLst>
       <p:ext uri="{BB962C8B-B14F-4D97-AF65-F5344CB8AC3E}">
@@ -9447,7 +10495,7 @@
         </p:nvSpPr>
         <p:spPr>
           <a:xfrm>
-            <a:off x="6442620" y="5855833"/>
+            <a:off x="5738625" y="6081622"/>
             <a:ext cx="801823" cy="461665"/>
           </a:xfrm>
           <a:prstGeom prst="rect">
@@ -9782,7 +10830,7 @@
         <p:spPr>
           <a:xfrm>
             <a:off x="4984922" y="5207260"/>
-            <a:ext cx="4317506" cy="369332"/>
+            <a:ext cx="4317506" cy="646331"/>
           </a:xfrm>
           <a:prstGeom prst="rect">
             <a:avLst/>
@@ -9797,7 +10845,25 @@
           <a:p>
             <a:r>
               <a:rPr lang="en-US" altLang="ko-KR" dirty="0" smtClean="0"/>
-              <a:t>e.g. pattern = [100, 150, 150, 100, 100]</a:t>
+              <a:t>e.g. pattern = [100, </a:t>
+            </a:r>
+            <a:r>
+              <a:rPr lang="en-US" altLang="ko-KR" dirty="0" smtClean="0"/>
+              <a:t>150</a:t>
+            </a:r>
+            <a:r>
+              <a:rPr lang="en-US" altLang="ko-KR" dirty="0" smtClean="0"/>
+              <a:t>, </a:t>
+            </a:r>
+            <a:r>
+              <a:rPr lang="en-US" altLang="ko-KR" dirty="0" smtClean="0"/>
+              <a:t>100,</a:t>
+            </a:r>
+          </a:p>
+          <a:p>
+            <a:r>
+              <a:rPr lang="en-US" altLang="ko-KR" dirty="0" smtClean="0"/>
+              <a:t>	                 150, 100]</a:t>
             </a:r>
             <a:endParaRPr lang="ko-KR" altLang="en-US" dirty="0"/>
           </a:p>
@@ -10001,6 +11067,145 @@
           </a:fontRef>
         </p:style>
       </p:cxnSp>
+      <p:sp>
+        <p:nvSpPr>
+          <p:cNvPr id="41" name="Right Brace 40"/>
+          <p:cNvSpPr/>
+          <p:nvPr/>
+        </p:nvSpPr>
+        <p:spPr>
+          <a:xfrm rot="16200000">
+            <a:off x="7181274" y="4609946"/>
+            <a:ext cx="126339" cy="1077184"/>
+          </a:xfrm>
+          <a:prstGeom prst="rightBrace">
+            <a:avLst>
+              <a:gd name="adj1" fmla="val 8333"/>
+              <a:gd name="adj2" fmla="val 53351"/>
+            </a:avLst>
+          </a:prstGeom>
+        </p:spPr>
+        <p:style>
+          <a:lnRef idx="1">
+            <a:schemeClr val="dk1"/>
+          </a:lnRef>
+          <a:fillRef idx="0">
+            <a:schemeClr val="dk1"/>
+          </a:fillRef>
+          <a:effectRef idx="0">
+            <a:schemeClr val="dk1"/>
+          </a:effectRef>
+          <a:fontRef idx="minor">
+            <a:schemeClr val="tx1"/>
+          </a:fontRef>
+        </p:style>
+        <p:txBody>
+          <a:bodyPr rtlCol="0" anchor="ctr"/>
+          <a:lstStyle/>
+          <a:p>
+            <a:pPr algn="ctr"/>
+            <a:endParaRPr lang="ko-KR" altLang="en-US"/>
+          </a:p>
+        </p:txBody>
+      </p:sp>
+      <p:sp>
+        <p:nvSpPr>
+          <p:cNvPr id="43" name="Right Brace 42"/>
+          <p:cNvSpPr/>
+          <p:nvPr/>
+        </p:nvSpPr>
+        <p:spPr>
+          <a:xfrm rot="5400000">
+            <a:off x="7412654" y="5618964"/>
+            <a:ext cx="191551" cy="661490"/>
+          </a:xfrm>
+          <a:prstGeom prst="rightBrace">
+            <a:avLst/>
+          </a:prstGeom>
+        </p:spPr>
+        <p:style>
+          <a:lnRef idx="1">
+            <a:schemeClr val="dk1"/>
+          </a:lnRef>
+          <a:fillRef idx="0">
+            <a:schemeClr val="dk1"/>
+          </a:fillRef>
+          <a:effectRef idx="0">
+            <a:schemeClr val="dk1"/>
+          </a:effectRef>
+          <a:fontRef idx="minor">
+            <a:schemeClr val="tx1"/>
+          </a:fontRef>
+        </p:style>
+        <p:txBody>
+          <a:bodyPr rtlCol="0" anchor="ctr"/>
+          <a:lstStyle/>
+          <a:p>
+            <a:pPr algn="ctr"/>
+            <a:endParaRPr lang="ko-KR" altLang="en-US"/>
+          </a:p>
+        </p:txBody>
+      </p:sp>
+      <p:sp>
+        <p:nvSpPr>
+          <p:cNvPr id="44" name="TextBox 43"/>
+          <p:cNvSpPr txBox="1"/>
+          <p:nvPr/>
+        </p:nvSpPr>
+        <p:spPr>
+          <a:xfrm>
+            <a:off x="6915784" y="4786560"/>
+            <a:ext cx="770660" cy="307777"/>
+          </a:xfrm>
+          <a:prstGeom prst="rect">
+            <a:avLst/>
+          </a:prstGeom>
+          <a:noFill/>
+        </p:spPr>
+        <p:txBody>
+          <a:bodyPr wrap="none" rtlCol="0">
+            <a:spAutoFit/>
+          </a:bodyPr>
+          <a:lstStyle/>
+          <a:p>
+            <a:r>
+              <a:rPr lang="en-US" altLang="ko-KR" sz="1400" dirty="0" smtClean="0"/>
+              <a:t>interval</a:t>
+            </a:r>
+            <a:endParaRPr lang="ko-KR" altLang="en-US" sz="1400" dirty="0"/>
+          </a:p>
+        </p:txBody>
+      </p:sp>
+      <p:sp>
+        <p:nvSpPr>
+          <p:cNvPr id="45" name="TextBox 44"/>
+          <p:cNvSpPr txBox="1"/>
+          <p:nvPr/>
+        </p:nvSpPr>
+        <p:spPr>
+          <a:xfrm>
+            <a:off x="7131788" y="6064408"/>
+            <a:ext cx="856325" cy="307777"/>
+          </a:xfrm>
+          <a:prstGeom prst="rect">
+            <a:avLst/>
+          </a:prstGeom>
+          <a:noFill/>
+        </p:spPr>
+        <p:txBody>
+          <a:bodyPr wrap="none" rtlCol="0">
+            <a:spAutoFit/>
+          </a:bodyPr>
+          <a:lstStyle/>
+          <a:p>
+            <a:r>
+              <a:rPr lang="en-US" altLang="ko-KR" sz="1400" dirty="0" smtClean="0"/>
+              <a:t>duration</a:t>
+            </a:r>
+            <a:endParaRPr lang="ko-KR" altLang="en-US" sz="1400" dirty="0"/>
+          </a:p>
+        </p:txBody>
+      </p:sp>
     </p:spTree>
     <p:extLst>
       <p:ext uri="{BB962C8B-B14F-4D97-AF65-F5344CB8AC3E}">
@@ -10293,23 +11498,8 @@
             </a:r>
             <a:r>
               <a:rPr lang="en-US" altLang="zh-CN" dirty="0" smtClean="0"/>
-              <a:t>: Need a lot of samples and longer computation time for better result</a:t>
-            </a:r>
-            <a:endParaRPr lang="en-US" altLang="zh-CN" dirty="0"/>
-          </a:p>
-          <a:p>
-            <a:pPr marL="342900" lvl="1" indent="-342900">
-              <a:spcBef>
-                <a:spcPts val="1000"/>
-              </a:spcBef>
-              <a:spcAft>
-                <a:spcPts val="0"/>
-              </a:spcAft>
-              <a:buClrTx/>
-              <a:buFont typeface="Arial" panose="020B0604020202020204" pitchFamily="34" charset="0"/>
-              <a:buChar char="•"/>
-            </a:pPr>
-            <a:endParaRPr lang="en-US" altLang="zh-CN" dirty="0" smtClean="0"/>
+              <a:t>: Need a lot of samples</a:t>
+            </a:r>
           </a:p>
           <a:p>
             <a:pPr marL="342900" lvl="1" indent="-342900">

</xml_diff>

<commit_message>
Add execution time and related code
</commit_message>
<xml_diff>
--- a/ksd-auth.pptx
+++ b/ksd-auth.pptx
@@ -6506,8 +6506,8 @@
         </p:nvSpPr>
         <p:spPr>
           <a:xfrm>
-            <a:off x="167775" y="3173162"/>
-            <a:ext cx="4320004" cy="2999038"/>
+            <a:off x="167775" y="3173161"/>
+            <a:ext cx="4320004" cy="3432175"/>
           </a:xfrm>
           <a:prstGeom prst="rect">
             <a:avLst/>
@@ -6714,13 +6714,54 @@
               <a:rPr lang="en-US" altLang="ko-KR" sz="2400" dirty="0" smtClean="0"/>
               <a:t>FRR(False Reject Rate) : </a:t>
             </a:r>
+            <a:endParaRPr lang="en-US" altLang="ko-KR" sz="2400" dirty="0"/>
           </a:p>
           <a:p>
             <a:pPr lvl="1"/>
             <a:r>
+              <a:rPr lang="en-US" altLang="ko-KR" sz="1400" dirty="0"/>
+              <a:t>Rejected patterns / tries by genuine </a:t>
+            </a:r>
+            <a:r>
               <a:rPr lang="en-US" altLang="ko-KR" sz="1400" dirty="0" smtClean="0"/>
-              <a:t>Rejected patterns / tries by genuine users</a:t>
-            </a:r>
+              <a:t>users</a:t>
+            </a:r>
+            <a:endParaRPr lang="en-US" altLang="ko-KR" sz="2400" dirty="0" smtClean="0"/>
+          </a:p>
+          <a:p>
+            <a:r>
+              <a:rPr lang="en-US" altLang="ko-KR" sz="2400" dirty="0" smtClean="0"/>
+              <a:t>Execution Time:</a:t>
+            </a:r>
+            <a:endParaRPr lang="en-US" altLang="ko-KR" sz="2400" dirty="0"/>
+          </a:p>
+          <a:p>
+            <a:pPr lvl="1"/>
+            <a:r>
+              <a:rPr lang="en-US" altLang="ko-KR" sz="1400" dirty="0" smtClean="0"/>
+              <a:t>Nearest Neighbor = 0.047 sec</a:t>
+            </a:r>
+          </a:p>
+          <a:p>
+            <a:pPr lvl="1"/>
+            <a:r>
+              <a:rPr lang="en-US" altLang="ko-KR" sz="1400" dirty="0" err="1" smtClean="0"/>
+              <a:t>Mahalanobis</a:t>
+            </a:r>
+            <a:r>
+              <a:rPr lang="en-US" altLang="ko-KR" sz="1400" dirty="0" smtClean="0"/>
+              <a:t> Distance = 0.197 sec</a:t>
+            </a:r>
+          </a:p>
+          <a:p>
+            <a:pPr lvl="1"/>
+            <a:r>
+              <a:rPr lang="en-US" altLang="ko-KR" sz="1400" dirty="0" smtClean="0"/>
+              <a:t>SVMs = 0.002 sec</a:t>
+            </a:r>
+            <a:endParaRPr lang="en-US" altLang="ko-KR" sz="2400" dirty="0" smtClean="0"/>
+          </a:p>
+          <a:p>
             <a:endParaRPr lang="ko-KR" sz="1400" dirty="0"/>
           </a:p>
         </p:txBody>
@@ -11155,7 +11196,7 @@
         <p:spPr>
           <a:xfrm>
             <a:off x="6915784" y="4786560"/>
-            <a:ext cx="770660" cy="307777"/>
+            <a:ext cx="856325" cy="307777"/>
           </a:xfrm>
           <a:prstGeom prst="rect">
             <a:avLst/>
@@ -11170,7 +11211,7 @@
           <a:p>
             <a:r>
               <a:rPr lang="en-US" altLang="ko-KR" sz="1400" dirty="0" smtClean="0"/>
-              <a:t>interval</a:t>
+              <a:t>duration</a:t>
             </a:r>
             <a:endParaRPr lang="ko-KR" altLang="en-US" sz="1400" dirty="0"/>
           </a:p>
@@ -11185,7 +11226,7 @@
         <p:spPr>
           <a:xfrm>
             <a:off x="7131788" y="6064408"/>
-            <a:ext cx="856325" cy="307777"/>
+            <a:ext cx="770660" cy="307777"/>
           </a:xfrm>
           <a:prstGeom prst="rect">
             <a:avLst/>
@@ -11200,7 +11241,7 @@
           <a:p>
             <a:r>
               <a:rPr lang="en-US" altLang="ko-KR" sz="1400" dirty="0" smtClean="0"/>
-              <a:t>duration</a:t>
+              <a:t>interval</a:t>
             </a:r>
             <a:endParaRPr lang="ko-KR" altLang="en-US" sz="1400" dirty="0"/>
           </a:p>
@@ -12008,7 +12049,7 @@
         </p:nvCxnSpPr>
         <p:spPr>
           <a:xfrm flipV="1">
-            <a:off x="627371" y="1810373"/>
+            <a:off x="567211" y="2063042"/>
             <a:ext cx="0" cy="2166551"/>
           </a:xfrm>
           <a:prstGeom prst="straightConnector1">
@@ -12041,7 +12082,7 @@
         </p:nvCxnSpPr>
         <p:spPr>
           <a:xfrm>
-            <a:off x="363761" y="3696838"/>
+            <a:off x="303601" y="3949507"/>
             <a:ext cx="2767913" cy="0"/>
           </a:xfrm>
           <a:prstGeom prst="straightConnector1">
@@ -12074,7 +12115,7 @@
         </p:nvSpPr>
         <p:spPr>
           <a:xfrm>
-            <a:off x="6704467" y="2042098"/>
+            <a:off x="6590560" y="2078412"/>
             <a:ext cx="2406621" cy="923330"/>
           </a:xfrm>
           <a:prstGeom prst="rect">
@@ -12108,7 +12149,7 @@
         </p:nvSpPr>
         <p:spPr>
           <a:xfrm rot="16200000">
-            <a:off x="3582059" y="2389911"/>
+            <a:off x="3582059" y="2570388"/>
             <a:ext cx="650789" cy="629889"/>
           </a:xfrm>
           <a:prstGeom prst="downArrow">
@@ -12148,7 +12189,7 @@
         </p:nvCxnSpPr>
         <p:spPr>
           <a:xfrm flipV="1">
-            <a:off x="4510650" y="1871376"/>
+            <a:off x="4510650" y="2051853"/>
             <a:ext cx="0" cy="2166551"/>
           </a:xfrm>
           <a:prstGeom prst="straightConnector1">
@@ -12181,7 +12222,7 @@
         </p:nvCxnSpPr>
         <p:spPr>
           <a:xfrm>
-            <a:off x="4247040" y="3757841"/>
+            <a:off x="4247040" y="3938318"/>
             <a:ext cx="2767913" cy="0"/>
           </a:xfrm>
           <a:prstGeom prst="straightConnector1">
@@ -12214,7 +12255,7 @@
         </p:nvSpPr>
         <p:spPr>
           <a:xfrm>
-            <a:off x="962266" y="1871466"/>
+            <a:off x="902106" y="2124135"/>
             <a:ext cx="1547988" cy="369332"/>
           </a:xfrm>
           <a:prstGeom prst="rect">
@@ -12244,7 +12285,7 @@
         </p:nvSpPr>
         <p:spPr>
           <a:xfrm>
-            <a:off x="5181076" y="3964319"/>
+            <a:off x="5143947" y="4036455"/>
             <a:ext cx="650789" cy="420130"/>
           </a:xfrm>
           <a:prstGeom prst="downArrow">
@@ -12284,7 +12325,7 @@
         </p:nvCxnSpPr>
         <p:spPr>
           <a:xfrm flipV="1">
-            <a:off x="4420291" y="4616766"/>
+            <a:off x="4516547" y="4616766"/>
             <a:ext cx="0" cy="2166551"/>
           </a:xfrm>
           <a:prstGeom prst="straightConnector1">
@@ -12317,7 +12358,7 @@
         </p:nvCxnSpPr>
         <p:spPr>
           <a:xfrm>
-            <a:off x="4156681" y="6503231"/>
+            <a:off x="4252937" y="6503231"/>
             <a:ext cx="2767913" cy="0"/>
           </a:xfrm>
           <a:prstGeom prst="straightConnector1">
@@ -12350,8 +12391,8 @@
         </p:nvSpPr>
         <p:spPr>
           <a:xfrm>
-            <a:off x="6430708" y="4351536"/>
-            <a:ext cx="2661639" cy="923330"/>
+            <a:off x="6508960" y="4553628"/>
+            <a:ext cx="2461296" cy="923330"/>
           </a:xfrm>
           <a:prstGeom prst="rect">
             <a:avLst/>
@@ -12380,7 +12421,7 @@
         </p:nvSpPr>
         <p:spPr>
           <a:xfrm>
-            <a:off x="5023064" y="5198870"/>
+            <a:off x="5119320" y="5198870"/>
             <a:ext cx="1103870" cy="815546"/>
           </a:xfrm>
           <a:custGeom>
@@ -14998,7 +15039,7 @@
         </p:nvSpPr>
         <p:spPr>
           <a:xfrm>
-            <a:off x="4973560" y="2300350"/>
+            <a:off x="4973560" y="2480827"/>
             <a:ext cx="88685" cy="88685"/>
           </a:xfrm>
           <a:prstGeom prst="plus">
@@ -15036,7 +15077,7 @@
         </p:nvSpPr>
         <p:spPr>
           <a:xfrm>
-            <a:off x="5125960" y="2452750"/>
+            <a:off x="5125960" y="2633227"/>
             <a:ext cx="88685" cy="88685"/>
           </a:xfrm>
           <a:prstGeom prst="plus">
@@ -15074,7 +15115,7 @@
         </p:nvSpPr>
         <p:spPr>
           <a:xfrm>
-            <a:off x="5425000" y="2358287"/>
+            <a:off x="5425000" y="2538764"/>
             <a:ext cx="88685" cy="88685"/>
           </a:xfrm>
           <a:prstGeom prst="plus">
@@ -15112,7 +15153,7 @@
         </p:nvSpPr>
         <p:spPr>
           <a:xfrm>
-            <a:off x="5430760" y="2757550"/>
+            <a:off x="5430760" y="2938027"/>
             <a:ext cx="88685" cy="88685"/>
           </a:xfrm>
           <a:prstGeom prst="plus">
@@ -15150,7 +15191,7 @@
         </p:nvSpPr>
         <p:spPr>
           <a:xfrm>
-            <a:off x="5314272" y="2965428"/>
+            <a:off x="5314272" y="3145905"/>
             <a:ext cx="88685" cy="88685"/>
           </a:xfrm>
           <a:prstGeom prst="plus">
@@ -15188,7 +15229,7 @@
         </p:nvSpPr>
         <p:spPr>
           <a:xfrm>
-            <a:off x="5735559" y="2757550"/>
+            <a:off x="5735559" y="2938027"/>
             <a:ext cx="88685" cy="88685"/>
           </a:xfrm>
           <a:prstGeom prst="plus">
@@ -15226,7 +15267,7 @@
         </p:nvSpPr>
         <p:spPr>
           <a:xfrm>
-            <a:off x="5678987" y="3058103"/>
+            <a:off x="5678987" y="3238580"/>
             <a:ext cx="88685" cy="88685"/>
           </a:xfrm>
           <a:prstGeom prst="plus">
@@ -15264,7 +15305,7 @@
         </p:nvSpPr>
         <p:spPr>
           <a:xfrm>
-            <a:off x="5976645" y="2953940"/>
+            <a:off x="5976645" y="3134417"/>
             <a:ext cx="88685" cy="88685"/>
           </a:xfrm>
           <a:prstGeom prst="plus">
@@ -15302,7 +15343,7 @@
         </p:nvSpPr>
         <p:spPr>
           <a:xfrm>
-            <a:off x="5976645" y="2592182"/>
+            <a:off x="5976645" y="2772659"/>
             <a:ext cx="88685" cy="88685"/>
           </a:xfrm>
           <a:prstGeom prst="plus">
@@ -15340,7 +15381,7 @@
         </p:nvSpPr>
         <p:spPr>
           <a:xfrm>
-            <a:off x="6123447" y="3377778"/>
+            <a:off x="6123447" y="3558255"/>
             <a:ext cx="88685" cy="88685"/>
           </a:xfrm>
           <a:prstGeom prst="plus">
@@ -15378,7 +15419,7 @@
         </p:nvSpPr>
         <p:spPr>
           <a:xfrm>
-            <a:off x="6300817" y="2829020"/>
+            <a:off x="6300817" y="3009497"/>
             <a:ext cx="88685" cy="88685"/>
           </a:xfrm>
           <a:prstGeom prst="plus">
@@ -15416,7 +15457,7 @@
         </p:nvSpPr>
         <p:spPr>
           <a:xfrm>
-            <a:off x="5408588" y="3273380"/>
+            <a:off x="5408588" y="3453857"/>
             <a:ext cx="88685" cy="88685"/>
           </a:xfrm>
           <a:prstGeom prst="plus">
@@ -15454,7 +15495,7 @@
         </p:nvSpPr>
         <p:spPr>
           <a:xfrm>
-            <a:off x="5735559" y="2274413"/>
+            <a:off x="5735559" y="2454890"/>
             <a:ext cx="88685" cy="88685"/>
           </a:xfrm>
           <a:prstGeom prst="plus">
@@ -15492,7 +15533,7 @@
         </p:nvSpPr>
         <p:spPr>
           <a:xfrm>
-            <a:off x="5079558" y="2821265"/>
+            <a:off x="5079558" y="3001742"/>
             <a:ext cx="88685" cy="88685"/>
           </a:xfrm>
           <a:prstGeom prst="plus">
@@ -15530,7 +15571,7 @@
         </p:nvSpPr>
         <p:spPr>
           <a:xfrm>
-            <a:off x="5624220" y="2556078"/>
+            <a:off x="5624220" y="2736555"/>
             <a:ext cx="88685" cy="88685"/>
           </a:xfrm>
           <a:prstGeom prst="plus">
@@ -15568,7 +15609,7 @@
         </p:nvSpPr>
         <p:spPr>
           <a:xfrm>
-            <a:off x="4929217" y="3219046"/>
+            <a:off x="4929217" y="3399523"/>
             <a:ext cx="88685" cy="88685"/>
           </a:xfrm>
           <a:prstGeom prst="plus">
@@ -15606,7 +15647,7 @@
         </p:nvSpPr>
         <p:spPr>
           <a:xfrm>
-            <a:off x="5887960" y="3214750"/>
+            <a:off x="5887960" y="3395227"/>
             <a:ext cx="88685" cy="88685"/>
           </a:xfrm>
           <a:prstGeom prst="plus">
@@ -15644,7 +15685,7 @@
         </p:nvSpPr>
         <p:spPr>
           <a:xfrm>
-            <a:off x="6212132" y="2349600"/>
+            <a:off x="6212132" y="2530077"/>
             <a:ext cx="88685" cy="88685"/>
           </a:xfrm>
           <a:prstGeom prst="plus">
@@ -15682,7 +15723,7 @@
         </p:nvSpPr>
         <p:spPr>
           <a:xfrm>
-            <a:off x="6256474" y="3082639"/>
+            <a:off x="6256474" y="3263116"/>
             <a:ext cx="88685" cy="88685"/>
           </a:xfrm>
           <a:prstGeom prst="plus">
@@ -15720,7 +15761,7 @@
         </p:nvSpPr>
         <p:spPr>
           <a:xfrm>
-            <a:off x="5606411" y="2808654"/>
+            <a:off x="5606411" y="2989131"/>
             <a:ext cx="88685" cy="88685"/>
           </a:xfrm>
           <a:prstGeom prst="plus">
@@ -15758,7 +15799,7 @@
         </p:nvSpPr>
         <p:spPr>
           <a:xfrm>
-            <a:off x="1756460" y="2686263"/>
+            <a:off x="1696300" y="2938932"/>
             <a:ext cx="88685" cy="88685"/>
           </a:xfrm>
           <a:prstGeom prst="plus">
@@ -15796,7 +15837,7 @@
         </p:nvSpPr>
         <p:spPr>
           <a:xfrm>
-            <a:off x="4863565" y="5079379"/>
+            <a:off x="4959821" y="5079379"/>
             <a:ext cx="88685" cy="88685"/>
           </a:xfrm>
           <a:prstGeom prst="plus">
@@ -15834,7 +15875,7 @@
         </p:nvSpPr>
         <p:spPr>
           <a:xfrm>
-            <a:off x="5015965" y="5231779"/>
+            <a:off x="5112221" y="5231779"/>
             <a:ext cx="88685" cy="88685"/>
           </a:xfrm>
           <a:prstGeom prst="plus">
@@ -15872,7 +15913,7 @@
         </p:nvSpPr>
         <p:spPr>
           <a:xfrm>
-            <a:off x="5315005" y="5137316"/>
+            <a:off x="5411261" y="5137316"/>
             <a:ext cx="88685" cy="88685"/>
           </a:xfrm>
           <a:prstGeom prst="plus">
@@ -15910,7 +15951,7 @@
         </p:nvSpPr>
         <p:spPr>
           <a:xfrm>
-            <a:off x="5320765" y="5536579"/>
+            <a:off x="5417021" y="5536579"/>
             <a:ext cx="88685" cy="88685"/>
           </a:xfrm>
           <a:prstGeom prst="plus">
@@ -15948,7 +15989,7 @@
         </p:nvSpPr>
         <p:spPr>
           <a:xfrm>
-            <a:off x="5204277" y="5744457"/>
+            <a:off x="5300533" y="5744457"/>
             <a:ext cx="88685" cy="88685"/>
           </a:xfrm>
           <a:prstGeom prst="plus">
@@ -15986,7 +16027,7 @@
         </p:nvSpPr>
         <p:spPr>
           <a:xfrm>
-            <a:off x="5625564" y="5536579"/>
+            <a:off x="5721820" y="5536579"/>
             <a:ext cx="88685" cy="88685"/>
           </a:xfrm>
           <a:prstGeom prst="plus">
@@ -16024,7 +16065,7 @@
         </p:nvSpPr>
         <p:spPr>
           <a:xfrm>
-            <a:off x="5568992" y="5837132"/>
+            <a:off x="5665248" y="5837132"/>
             <a:ext cx="88685" cy="88685"/>
           </a:xfrm>
           <a:prstGeom prst="plus">
@@ -16062,7 +16103,7 @@
         </p:nvSpPr>
         <p:spPr>
           <a:xfrm>
-            <a:off x="5866650" y="5732969"/>
+            <a:off x="5962906" y="5732969"/>
             <a:ext cx="88685" cy="88685"/>
           </a:xfrm>
           <a:prstGeom prst="plus">
@@ -16100,7 +16141,7 @@
         </p:nvSpPr>
         <p:spPr>
           <a:xfrm>
-            <a:off x="5866650" y="5371211"/>
+            <a:off x="5962906" y="5371211"/>
             <a:ext cx="88685" cy="88685"/>
           </a:xfrm>
           <a:prstGeom prst="plus">
@@ -16138,7 +16179,7 @@
         </p:nvSpPr>
         <p:spPr>
           <a:xfrm>
-            <a:off x="6013452" y="6156807"/>
+            <a:off x="6109708" y="6156807"/>
             <a:ext cx="88685" cy="88685"/>
           </a:xfrm>
           <a:prstGeom prst="plus">
@@ -16176,7 +16217,7 @@
         </p:nvSpPr>
         <p:spPr>
           <a:xfrm>
-            <a:off x="6190822" y="5608049"/>
+            <a:off x="6287078" y="5608049"/>
             <a:ext cx="88685" cy="88685"/>
           </a:xfrm>
           <a:prstGeom prst="plus">
@@ -16214,7 +16255,7 @@
         </p:nvSpPr>
         <p:spPr>
           <a:xfrm>
-            <a:off x="5298593" y="6052409"/>
+            <a:off x="5394849" y="6052409"/>
             <a:ext cx="88685" cy="88685"/>
           </a:xfrm>
           <a:prstGeom prst="plus">
@@ -16252,7 +16293,7 @@
         </p:nvSpPr>
         <p:spPr>
           <a:xfrm>
-            <a:off x="5625564" y="5053442"/>
+            <a:off x="5721820" y="5053442"/>
             <a:ext cx="88685" cy="88685"/>
           </a:xfrm>
           <a:prstGeom prst="plus">
@@ -16290,7 +16331,7 @@
         </p:nvSpPr>
         <p:spPr>
           <a:xfrm>
-            <a:off x="4969563" y="5600294"/>
+            <a:off x="5065819" y="5600294"/>
             <a:ext cx="88685" cy="88685"/>
           </a:xfrm>
           <a:prstGeom prst="plus">
@@ -16328,7 +16369,7 @@
         </p:nvSpPr>
         <p:spPr>
           <a:xfrm>
-            <a:off x="5514225" y="5335107"/>
+            <a:off x="5610481" y="5335107"/>
             <a:ext cx="88685" cy="88685"/>
           </a:xfrm>
           <a:prstGeom prst="plus">
@@ -16366,7 +16407,7 @@
         </p:nvSpPr>
         <p:spPr>
           <a:xfrm>
-            <a:off x="4819222" y="5998075"/>
+            <a:off x="4915478" y="5998075"/>
             <a:ext cx="88685" cy="88685"/>
           </a:xfrm>
           <a:prstGeom prst="plus">
@@ -16404,7 +16445,7 @@
         </p:nvSpPr>
         <p:spPr>
           <a:xfrm>
-            <a:off x="5777965" y="5993779"/>
+            <a:off x="5874221" y="5993779"/>
             <a:ext cx="88685" cy="88685"/>
           </a:xfrm>
           <a:prstGeom prst="plus">
@@ -16442,7 +16483,7 @@
         </p:nvSpPr>
         <p:spPr>
           <a:xfrm>
-            <a:off x="6102137" y="5128629"/>
+            <a:off x="6198393" y="5128629"/>
             <a:ext cx="88685" cy="88685"/>
           </a:xfrm>
           <a:prstGeom prst="plus">
@@ -16480,7 +16521,7 @@
         </p:nvSpPr>
         <p:spPr>
           <a:xfrm>
-            <a:off x="6146479" y="5861668"/>
+            <a:off x="6242735" y="5861668"/>
             <a:ext cx="88685" cy="88685"/>
           </a:xfrm>
           <a:prstGeom prst="plus">
@@ -16518,7 +16559,7 @@
         </p:nvSpPr>
         <p:spPr>
           <a:xfrm>
-            <a:off x="5496416" y="5587683"/>
+            <a:off x="5592672" y="5587683"/>
             <a:ext cx="88685" cy="88685"/>
           </a:xfrm>
           <a:prstGeom prst="plus">

</xml_diff>

<commit_message>
Fixed the name of algorithms
</commit_message>
<xml_diff>
--- a/ksd-auth.pptx
+++ b/ksd-auth.pptx
@@ -12173,7 +12173,11 @@
           <a:p>
             <a:r>
               <a:rPr lang="en-US" altLang="zh-CN" dirty="0" smtClean="0"/>
-              <a:t>Matching Algorithms</a:t>
+              <a:t>Detecting Novelty </a:t>
+            </a:r>
+            <a:r>
+              <a:rPr lang="en-US" altLang="zh-CN" dirty="0" smtClean="0"/>
+              <a:t>Algorithms</a:t>
             </a:r>
           </a:p>
           <a:p>
@@ -12188,8 +12192,13 @@
             </a:pPr>
             <a:r>
               <a:rPr lang="en-US" altLang="zh-CN" dirty="0" smtClean="0"/>
-              <a:t>Statistical(Geometric) Measurement</a:t>
-            </a:r>
+              <a:t>Statistical(Geometric) </a:t>
+            </a:r>
+            <a:r>
+              <a:rPr lang="en-US" altLang="zh-CN" dirty="0" smtClean="0"/>
+              <a:t>Algorithms</a:t>
+            </a:r>
+            <a:endParaRPr lang="en-US" altLang="zh-CN" dirty="0" smtClean="0"/>
           </a:p>
           <a:p>
             <a:pPr marL="342900" lvl="1" indent="-342900">
@@ -12205,19 +12214,7 @@
             </a:pPr>
             <a:r>
               <a:rPr lang="en-US" altLang="zh-CN" dirty="0" smtClean="0"/>
-              <a:t>Nearest </a:t>
-            </a:r>
-            <a:r>
-              <a:rPr lang="en-US" altLang="zh-CN" dirty="0" smtClean="0"/>
-              <a:t>Neighbor (Ball tree algorithm) </a:t>
-            </a:r>
-            <a:r>
-              <a:rPr lang="en-US" altLang="zh-CN" dirty="0" smtClean="0"/>
-              <a:t>using </a:t>
-            </a:r>
-            <a:r>
-              <a:rPr lang="en-US" altLang="zh-CN" dirty="0" smtClean="0"/>
-              <a:t>Euclidean Distance</a:t>
+              <a:t>Nearest Neighbor using ball tree algorithm</a:t>
             </a:r>
           </a:p>
           <a:p>
@@ -12240,7 +12237,15 @@
             </a:r>
             <a:r>
               <a:rPr lang="en-US" altLang="zh-CN" dirty="0" smtClean="0"/>
-              <a:t>Distance from the nearest neighbor</a:t>
+              <a:t>Distance from </a:t>
+            </a:r>
+            <a:r>
+              <a:rPr lang="en-US" altLang="zh-CN" smtClean="0"/>
+              <a:t>a point to </a:t>
+            </a:r>
+            <a:r>
+              <a:rPr lang="en-US" altLang="zh-CN" dirty="0" smtClean="0"/>
+              <a:t>the nearest neighbor</a:t>
             </a:r>
           </a:p>
           <a:p>

</xml_diff>